<commit_message>
updates to match, added vmatch
</commit_message>
<xml_diff>
--- a/graphAlgorithms/ecolor/figs.pptx
+++ b/graphAlgorithms/ecolor/figs.pptx
@@ -6,18 +6,17 @@
     <p:sldMasterId id="2147483651" r:id="rId2"/>
   </p:sldMasterIdLst>
   <p:notesMasterIdLst>
-    <p:notesMasterId r:id="rId9"/>
+    <p:notesMasterId r:id="rId8"/>
   </p:notesMasterIdLst>
   <p:handoutMasterIdLst>
-    <p:handoutMasterId r:id="rId10"/>
+    <p:handoutMasterId r:id="rId9"/>
   </p:handoutMasterIdLst>
   <p:sldIdLst>
     <p:sldId id="743" r:id="rId3"/>
     <p:sldId id="745" r:id="rId4"/>
-    <p:sldId id="746" r:id="rId5"/>
-    <p:sldId id="747" r:id="rId6"/>
-    <p:sldId id="748" r:id="rId7"/>
-    <p:sldId id="744" r:id="rId8"/>
+    <p:sldId id="747" r:id="rId5"/>
+    <p:sldId id="748" r:id="rId6"/>
+    <p:sldId id="744" r:id="rId7"/>
   </p:sldIdLst>
   <p:sldSz cx="9144000" cy="6858000" type="letter"/>
   <p:notesSz cx="6985000" cy="9283700"/>
@@ -1139,7 +1138,7 @@
     </p:spTree>
     <p:extLst>
       <p:ext uri="{BB962C8B-B14F-4D97-AF65-F5344CB8AC3E}">
-        <p14:creationId xmlns:p14="http://schemas.microsoft.com/office/powerpoint/2010/main" val="1023754878"/>
+        <p14:creationId xmlns:p14="http://schemas.microsoft.com/office/powerpoint/2010/main" val="313239554"/>
       </p:ext>
     </p:extLst>
   </p:cSld>
@@ -1228,7 +1227,7 @@
     </p:spTree>
     <p:extLst>
       <p:ext uri="{BB962C8B-B14F-4D97-AF65-F5344CB8AC3E}">
-        <p14:creationId xmlns:p14="http://schemas.microsoft.com/office/powerpoint/2010/main" val="313239554"/>
+        <p14:creationId xmlns:p14="http://schemas.microsoft.com/office/powerpoint/2010/main" val="2144757540"/>
       </p:ext>
     </p:extLst>
   </p:cSld>
@@ -1272,99 +1271,10 @@
           <a:bodyPr/>
           <a:lstStyle/>
           <a:p>
-            <a:fld id="{75FCB6E0-B47C-47A4-BE17-A4D81E87DC7F}" type="slidenum">
+            <a:fld id="{23913E3E-D4D3-4C25-A31B-4FD5D8B95C82}" type="slidenum">
               <a:rPr lang="en-US"/>
               <a:pPr/>
               <a:t>5</a:t>
-            </a:fld>
-            <a:endParaRPr lang="en-US"/>
-          </a:p>
-        </p:txBody>
-      </p:sp>
-      <p:sp>
-        <p:nvSpPr>
-          <p:cNvPr id="581634" name="Rectangle 2"/>
-          <p:cNvSpPr>
-            <a:spLocks noGrp="1" noRot="1" noChangeAspect="1" noChangeArrowheads="1" noTextEdit="1"/>
-          </p:cNvSpPr>
-          <p:nvPr>
-            <p:ph type="sldImg"/>
-          </p:nvPr>
-        </p:nvSpPr>
-        <p:spPr>
-          <a:ln/>
-        </p:spPr>
-      </p:sp>
-      <p:sp>
-        <p:nvSpPr>
-          <p:cNvPr id="581635" name="Rectangle 3"/>
-          <p:cNvSpPr>
-            <a:spLocks noGrp="1" noChangeArrowheads="1"/>
-          </p:cNvSpPr>
-          <p:nvPr>
-            <p:ph type="body" idx="1"/>
-          </p:nvPr>
-        </p:nvSpPr>
-        <p:spPr/>
-        <p:txBody>
-          <a:bodyPr/>
-          <a:lstStyle/>
-          <a:p>
-            <a:endParaRPr lang="en-US"/>
-          </a:p>
-        </p:txBody>
-      </p:sp>
-    </p:spTree>
-    <p:extLst>
-      <p:ext uri="{BB962C8B-B14F-4D97-AF65-F5344CB8AC3E}">
-        <p14:creationId xmlns:p14="http://schemas.microsoft.com/office/powerpoint/2010/main" val="2144757540"/>
-      </p:ext>
-    </p:extLst>
-  </p:cSld>
-  <p:clrMapOvr>
-    <a:masterClrMapping/>
-  </p:clrMapOvr>
-</p:notes>
-</file>
-
-<file path=ppt/notesSlides/notesSlide6.xml><?xml version="1.0" encoding="utf-8"?>
-<p:notes xmlns:a="http://schemas.openxmlformats.org/drawingml/2006/main" xmlns:r="http://schemas.openxmlformats.org/officeDocument/2006/relationships" xmlns:p="http://schemas.openxmlformats.org/presentationml/2006/main">
-  <p:cSld>
-    <p:spTree>
-      <p:nvGrpSpPr>
-        <p:cNvPr id="1" name=""/>
-        <p:cNvGrpSpPr/>
-        <p:nvPr/>
-      </p:nvGrpSpPr>
-      <p:grpSpPr>
-        <a:xfrm>
-          <a:off x="0" y="0"/>
-          <a:ext cx="0" cy="0"/>
-          <a:chOff x="0" y="0"/>
-          <a:chExt cx="0" cy="0"/>
-        </a:xfrm>
-      </p:grpSpPr>
-      <p:sp>
-        <p:nvSpPr>
-          <p:cNvPr id="7" name="Rectangle 7"/>
-          <p:cNvSpPr>
-            <a:spLocks noGrp="1" noChangeArrowheads="1"/>
-          </p:cNvSpPr>
-          <p:nvPr>
-            <p:ph type="sldNum" sz="quarter" idx="5"/>
-          </p:nvPr>
-        </p:nvSpPr>
-        <p:spPr>
-          <a:ln/>
-        </p:spPr>
-        <p:txBody>
-          <a:bodyPr/>
-          <a:lstStyle/>
-          <a:p>
-            <a:fld id="{23913E3E-D4D3-4C25-A31B-4FD5D8B95C82}" type="slidenum">
-              <a:rPr lang="en-US"/>
-              <a:pPr/>
-              <a:t>6</a:t>
             </a:fld>
             <a:endParaRPr lang="en-US"/>
           </a:p>
@@ -19675,3705 +19585,6 @@
           <a:p>
             <a:r>
               <a:rPr lang="en-US" dirty="0" err="1"/>
-              <a:t>mdmatch</a:t>
-            </a:r>
-            <a:endParaRPr lang="en-US" dirty="0"/>
-          </a:p>
-        </p:txBody>
-      </p:sp>
-      <p:grpSp>
-        <p:nvGrpSpPr>
-          <p:cNvPr id="429097" name="Group 429096">
-            <a:extLst>
-              <a:ext uri="{FF2B5EF4-FFF2-40B4-BE49-F238E27FC236}">
-                <a16:creationId xmlns:a16="http://schemas.microsoft.com/office/drawing/2014/main" id="{726C5CDC-30D4-319B-EDF8-E1192A9D07B1}"/>
-              </a:ext>
-            </a:extLst>
-          </p:cNvPr>
-          <p:cNvGrpSpPr/>
-          <p:nvPr/>
-        </p:nvGrpSpPr>
-        <p:grpSpPr>
-          <a:xfrm>
-            <a:off x="56647" y="1590678"/>
-            <a:ext cx="9706953" cy="1267026"/>
-            <a:chOff x="56647" y="1590678"/>
-            <a:chExt cx="9706953" cy="1267026"/>
-          </a:xfrm>
-        </p:grpSpPr>
-        <p:sp>
-          <p:nvSpPr>
-            <p:cNvPr id="429127" name="Right Arrow 429126">
-              <a:extLst>
-                <a:ext uri="{FF2B5EF4-FFF2-40B4-BE49-F238E27FC236}">
-                  <a16:creationId xmlns:a16="http://schemas.microsoft.com/office/drawing/2014/main" id="{035D381D-4259-8F88-E5BE-830C5A6CA79E}"/>
-                </a:ext>
-              </a:extLst>
-            </p:cNvPr>
-            <p:cNvSpPr/>
-            <p:nvPr/>
-          </p:nvSpPr>
-          <p:spPr bwMode="auto">
-            <a:xfrm>
-              <a:off x="2585746" y="2099005"/>
-              <a:ext cx="424543" cy="250372"/>
-            </a:xfrm>
-            <a:prstGeom prst="rightArrow">
-              <a:avLst/>
-            </a:prstGeom>
-            <a:solidFill>
-              <a:schemeClr val="accent1"/>
-            </a:solidFill>
-            <a:ln w="12700" cap="flat" cmpd="sng" algn="ctr">
-              <a:solidFill>
-                <a:schemeClr val="tx1"/>
-              </a:solidFill>
-              <a:prstDash val="solid"/>
-              <a:round/>
-              <a:headEnd type="none" w="sm" len="sm"/>
-              <a:tailEnd type="none" w="sm" len="sm"/>
-            </a:ln>
-            <a:effectLst/>
-          </p:spPr>
-          <p:txBody>
-            <a:bodyPr vert="horz" wrap="square" lIns="91440" tIns="45720" rIns="91440" bIns="45720" numCol="1" rtlCol="0" anchor="t" anchorCtr="0" compatLnSpc="1">
-              <a:prstTxWarp prst="textNoShape">
-                <a:avLst/>
-              </a:prstTxWarp>
-            </a:bodyPr>
-            <a:lstStyle/>
-            <a:p>
-              <a:pPr marL="0" marR="0" indent="0" algn="l" defTabSz="914400" rtl="0" eaLnBrk="0" fontAlgn="base" latinLnBrk="0" hangingPunct="0">
-                <a:lnSpc>
-                  <a:spcPct val="100000"/>
-                </a:lnSpc>
-                <a:spcBef>
-                  <a:spcPct val="0"/>
-                </a:spcBef>
-                <a:spcAft>
-                  <a:spcPct val="0"/>
-                </a:spcAft>
-                <a:buClrTx/>
-                <a:buSzTx/>
-                <a:buFontTx/>
-                <a:buNone/>
-                <a:tabLst/>
-              </a:pPr>
-              <a:endParaRPr kumimoji="0" lang="en-US" sz="1600" b="0" i="0" u="none" strike="noStrike" cap="none" normalizeH="0" baseline="0">
-                <a:ln>
-                  <a:noFill/>
-                </a:ln>
-                <a:solidFill>
-                  <a:schemeClr val="tx2"/>
-                </a:solidFill>
-                <a:effectLst/>
-                <a:latin typeface="Book Antiqua" pitchFamily="18" charset="0"/>
-              </a:endParaRPr>
-            </a:p>
-          </p:txBody>
-        </p:sp>
-        <p:grpSp>
-          <p:nvGrpSpPr>
-            <p:cNvPr id="429096" name="Group 429095">
-              <a:extLst>
-                <a:ext uri="{FF2B5EF4-FFF2-40B4-BE49-F238E27FC236}">
-                  <a16:creationId xmlns:a16="http://schemas.microsoft.com/office/drawing/2014/main" id="{B24A12C1-6F53-FB75-61CA-8A9ECC4CFDBB}"/>
-                </a:ext>
-              </a:extLst>
-            </p:cNvPr>
-            <p:cNvGrpSpPr/>
-            <p:nvPr/>
-          </p:nvGrpSpPr>
-          <p:grpSpPr>
-            <a:xfrm>
-              <a:off x="56647" y="1600554"/>
-              <a:ext cx="2393078" cy="1247275"/>
-              <a:chOff x="56647" y="1610429"/>
-              <a:chExt cx="2393078" cy="1247275"/>
-            </a:xfrm>
-          </p:grpSpPr>
-          <p:sp>
-            <p:nvSpPr>
-              <p:cNvPr id="36" name="Oval 35"/>
-              <p:cNvSpPr/>
-              <p:nvPr/>
-            </p:nvSpPr>
-            <p:spPr bwMode="auto">
-              <a:xfrm>
-                <a:off x="752817" y="1969667"/>
-                <a:ext cx="216284" cy="216284"/>
-              </a:xfrm>
-              <a:prstGeom prst="ellipse">
-                <a:avLst/>
-              </a:prstGeom>
-              <a:solidFill>
-                <a:srgbClr val="CCFFFF"/>
-              </a:solidFill>
-              <a:ln w="12700" cap="flat" cmpd="sng" algn="ctr">
-                <a:solidFill>
-                  <a:schemeClr val="tx1"/>
-                </a:solidFill>
-                <a:prstDash val="solid"/>
-                <a:round/>
-                <a:headEnd type="none" w="sm" len="sm"/>
-                <a:tailEnd type="none" w="sm" len="sm"/>
-              </a:ln>
-              <a:effectLst/>
-            </p:spPr>
-            <p:txBody>
-              <a:bodyPr vert="horz" wrap="square" lIns="91440" tIns="45720" rIns="91440" bIns="45720" numCol="1" rtlCol="0" anchor="ctr" anchorCtr="0" compatLnSpc="1">
-                <a:prstTxWarp prst="textNoShape">
-                  <a:avLst/>
-                </a:prstTxWarp>
-              </a:bodyPr>
-              <a:lstStyle/>
-              <a:p>
-                <a:pPr marL="0" marR="0" indent="0" algn="ctr" defTabSz="914400" rtl="0" eaLnBrk="0" fontAlgn="base" latinLnBrk="0" hangingPunct="0">
-                  <a:lnSpc>
-                    <a:spcPct val="100000"/>
-                  </a:lnSpc>
-                  <a:spcBef>
-                    <a:spcPct val="0"/>
-                  </a:spcBef>
-                  <a:spcAft>
-                    <a:spcPct val="0"/>
-                  </a:spcAft>
-                  <a:buClrTx/>
-                  <a:buSzTx/>
-                  <a:buFontTx/>
-                  <a:buNone/>
-                  <a:tabLst/>
-                </a:pPr>
-                <a:r>
-                  <a:rPr kumimoji="0" lang="en-US" sz="1200" b="0" i="1" u="none" strike="noStrike" cap="none" normalizeH="0" baseline="0" dirty="0">
-                    <a:ln>
-                      <a:noFill/>
-                    </a:ln>
-                    <a:solidFill>
-                      <a:schemeClr val="tx2"/>
-                    </a:solidFill>
-                    <a:effectLst/>
-                    <a:latin typeface="Verdana" panose="020B0604030504040204" pitchFamily="34" charset="0"/>
-                    <a:ea typeface="Verdana" panose="020B0604030504040204" pitchFamily="34" charset="0"/>
-                    <a:cs typeface="Verdana" panose="020B0604030504040204" pitchFamily="34" charset="0"/>
-                  </a:rPr>
-                  <a:t>b</a:t>
-                </a:r>
-              </a:p>
-            </p:txBody>
-          </p:sp>
-          <p:sp>
-            <p:nvSpPr>
-              <p:cNvPr id="37" name="Oval 36"/>
-              <p:cNvSpPr/>
-              <p:nvPr/>
-            </p:nvSpPr>
-            <p:spPr bwMode="auto">
-              <a:xfrm>
-                <a:off x="56647" y="2641420"/>
-                <a:ext cx="216284" cy="216284"/>
-              </a:xfrm>
-              <a:prstGeom prst="ellipse">
-                <a:avLst/>
-              </a:prstGeom>
-              <a:solidFill>
-                <a:srgbClr val="CCFFFF"/>
-              </a:solidFill>
-              <a:ln w="12700" cap="flat" cmpd="sng" algn="ctr">
-                <a:solidFill>
-                  <a:schemeClr val="tx1"/>
-                </a:solidFill>
-                <a:prstDash val="solid"/>
-                <a:round/>
-                <a:headEnd type="none" w="sm" len="sm"/>
-                <a:tailEnd type="none" w="sm" len="sm"/>
-              </a:ln>
-              <a:effectLst/>
-            </p:spPr>
-            <p:txBody>
-              <a:bodyPr vert="horz" wrap="square" lIns="91440" tIns="45720" rIns="91440" bIns="45720" numCol="1" rtlCol="0" anchor="ctr" anchorCtr="0" compatLnSpc="1">
-                <a:prstTxWarp prst="textNoShape">
-                  <a:avLst/>
-                </a:prstTxWarp>
-              </a:bodyPr>
-              <a:lstStyle/>
-              <a:p>
-                <a:pPr marL="0" marR="0" indent="0" algn="ctr" defTabSz="914400" rtl="0" eaLnBrk="0" fontAlgn="base" latinLnBrk="0" hangingPunct="0">
-                  <a:lnSpc>
-                    <a:spcPct val="100000"/>
-                  </a:lnSpc>
-                  <a:spcBef>
-                    <a:spcPct val="0"/>
-                  </a:spcBef>
-                  <a:spcAft>
-                    <a:spcPct val="0"/>
-                  </a:spcAft>
-                  <a:buClrTx/>
-                  <a:buSzTx/>
-                  <a:buFontTx/>
-                  <a:buNone/>
-                  <a:tabLst/>
-                </a:pPr>
-                <a:r>
-                  <a:rPr kumimoji="0" lang="en-US" sz="1200" b="0" i="1" u="none" strike="noStrike" cap="none" normalizeH="0" baseline="0" dirty="0">
-                    <a:ln>
-                      <a:noFill/>
-                    </a:ln>
-                    <a:solidFill>
-                      <a:schemeClr val="tx2"/>
-                    </a:solidFill>
-                    <a:effectLst/>
-                    <a:latin typeface="Verdana" panose="020B0604030504040204" pitchFamily="34" charset="0"/>
-                    <a:ea typeface="Verdana" panose="020B0604030504040204" pitchFamily="34" charset="0"/>
-                    <a:cs typeface="Verdana" panose="020B0604030504040204" pitchFamily="34" charset="0"/>
-                  </a:rPr>
-                  <a:t>c</a:t>
-                </a:r>
-              </a:p>
-            </p:txBody>
-          </p:sp>
-          <p:sp>
-            <p:nvSpPr>
-              <p:cNvPr id="38" name="Oval 37"/>
-              <p:cNvSpPr/>
-              <p:nvPr/>
-            </p:nvSpPr>
-            <p:spPr bwMode="auto">
-              <a:xfrm>
-                <a:off x="2233441" y="1610429"/>
-                <a:ext cx="216284" cy="216284"/>
-              </a:xfrm>
-              <a:prstGeom prst="ellipse">
-                <a:avLst/>
-              </a:prstGeom>
-              <a:solidFill>
-                <a:srgbClr val="CCFFFF"/>
-              </a:solidFill>
-              <a:ln w="12700" cap="flat" cmpd="sng" algn="ctr">
-                <a:solidFill>
-                  <a:schemeClr val="tx1"/>
-                </a:solidFill>
-                <a:prstDash val="solid"/>
-                <a:round/>
-                <a:headEnd type="none" w="sm" len="sm"/>
-                <a:tailEnd type="none" w="sm" len="sm"/>
-              </a:ln>
-              <a:effectLst/>
-            </p:spPr>
-            <p:txBody>
-              <a:bodyPr vert="horz" wrap="square" lIns="91440" tIns="45720" rIns="91440" bIns="45720" numCol="1" rtlCol="0" anchor="ctr" anchorCtr="0" compatLnSpc="1">
-                <a:prstTxWarp prst="textNoShape">
-                  <a:avLst/>
-                </a:prstTxWarp>
-              </a:bodyPr>
-              <a:lstStyle/>
-              <a:p>
-                <a:pPr marL="0" marR="0" indent="0" algn="ctr" defTabSz="914400" rtl="0" eaLnBrk="0" fontAlgn="base" latinLnBrk="0" hangingPunct="0">
-                  <a:lnSpc>
-                    <a:spcPct val="100000"/>
-                  </a:lnSpc>
-                  <a:spcBef>
-                    <a:spcPct val="0"/>
-                  </a:spcBef>
-                  <a:spcAft>
-                    <a:spcPct val="0"/>
-                  </a:spcAft>
-                  <a:buClrTx/>
-                  <a:buSzTx/>
-                  <a:buFontTx/>
-                  <a:buNone/>
-                  <a:tabLst/>
-                </a:pPr>
-                <a:r>
-                  <a:rPr kumimoji="0" lang="en-US" sz="1200" b="0" i="1" u="none" strike="noStrike" cap="none" normalizeH="0" baseline="0" dirty="0">
-                    <a:ln>
-                      <a:noFill/>
-                    </a:ln>
-                    <a:solidFill>
-                      <a:schemeClr val="tx2"/>
-                    </a:solidFill>
-                    <a:effectLst/>
-                    <a:latin typeface="Verdana" panose="020B0604030504040204" pitchFamily="34" charset="0"/>
-                    <a:ea typeface="Verdana" panose="020B0604030504040204" pitchFamily="34" charset="0"/>
-                    <a:cs typeface="Verdana" panose="020B0604030504040204" pitchFamily="34" charset="0"/>
-                  </a:rPr>
-                  <a:t>f</a:t>
-                </a:r>
-              </a:p>
-            </p:txBody>
-          </p:sp>
-          <p:sp>
-            <p:nvSpPr>
-              <p:cNvPr id="39" name="Oval 38"/>
-              <p:cNvSpPr/>
-              <p:nvPr/>
-            </p:nvSpPr>
-            <p:spPr bwMode="auto">
-              <a:xfrm>
-                <a:off x="57953" y="1610429"/>
-                <a:ext cx="216284" cy="216284"/>
-              </a:xfrm>
-              <a:prstGeom prst="ellipse">
-                <a:avLst/>
-              </a:prstGeom>
-              <a:solidFill>
-                <a:srgbClr val="CCFFCC"/>
-              </a:solidFill>
-              <a:ln w="12700" cap="flat" cmpd="sng" algn="ctr">
-                <a:solidFill>
-                  <a:schemeClr val="tx1"/>
-                </a:solidFill>
-                <a:prstDash val="solid"/>
-                <a:round/>
-                <a:headEnd type="none" w="sm" len="sm"/>
-                <a:tailEnd type="none" w="sm" len="sm"/>
-              </a:ln>
-              <a:effectLst/>
-            </p:spPr>
-            <p:txBody>
-              <a:bodyPr vert="horz" wrap="square" lIns="91440" tIns="45720" rIns="91440" bIns="45720" numCol="1" rtlCol="0" anchor="ctr" anchorCtr="0" compatLnSpc="1">
-                <a:prstTxWarp prst="textNoShape">
-                  <a:avLst/>
-                </a:prstTxWarp>
-              </a:bodyPr>
-              <a:lstStyle/>
-              <a:p>
-                <a:pPr marL="0" marR="0" indent="0" algn="ctr" defTabSz="914400" rtl="0" eaLnBrk="0" fontAlgn="base" latinLnBrk="0" hangingPunct="0">
-                  <a:lnSpc>
-                    <a:spcPct val="100000"/>
-                  </a:lnSpc>
-                  <a:spcBef>
-                    <a:spcPct val="0"/>
-                  </a:spcBef>
-                  <a:spcAft>
-                    <a:spcPct val="0"/>
-                  </a:spcAft>
-                  <a:buClrTx/>
-                  <a:buSzTx/>
-                  <a:buFontTx/>
-                  <a:buNone/>
-                  <a:tabLst/>
-                </a:pPr>
-                <a:r>
-                  <a:rPr kumimoji="0" lang="en-US" sz="1200" b="0" i="1" u="none" strike="noStrike" cap="none" normalizeH="0" baseline="0" dirty="0">
-                    <a:ln>
-                      <a:noFill/>
-                    </a:ln>
-                    <a:solidFill>
-                      <a:schemeClr val="tx2"/>
-                    </a:solidFill>
-                    <a:effectLst/>
-                    <a:latin typeface="Verdana" panose="020B0604030504040204" pitchFamily="34" charset="0"/>
-                    <a:ea typeface="Verdana" panose="020B0604030504040204" pitchFamily="34" charset="0"/>
-                    <a:cs typeface="Verdana" panose="020B0604030504040204" pitchFamily="34" charset="0"/>
-                  </a:rPr>
-                  <a:t>a</a:t>
-                </a:r>
-              </a:p>
-            </p:txBody>
-          </p:sp>
-          <p:sp>
-            <p:nvSpPr>
-              <p:cNvPr id="40" name="Oval 39"/>
-              <p:cNvSpPr/>
-              <p:nvPr/>
-            </p:nvSpPr>
-            <p:spPr bwMode="auto">
-              <a:xfrm>
-                <a:off x="1480661" y="2641420"/>
-                <a:ext cx="216284" cy="216284"/>
-              </a:xfrm>
-              <a:prstGeom prst="ellipse">
-                <a:avLst/>
-              </a:prstGeom>
-              <a:solidFill>
-                <a:srgbClr val="CCFFFF"/>
-              </a:solidFill>
-              <a:ln w="12700" cap="flat" cmpd="sng" algn="ctr">
-                <a:solidFill>
-                  <a:schemeClr val="tx1"/>
-                </a:solidFill>
-                <a:prstDash val="solid"/>
-                <a:round/>
-                <a:headEnd type="none" w="sm" len="sm"/>
-                <a:tailEnd type="none" w="sm" len="sm"/>
-              </a:ln>
-              <a:effectLst/>
-            </p:spPr>
-            <p:txBody>
-              <a:bodyPr vert="horz" wrap="square" lIns="91440" tIns="45720" rIns="91440" bIns="45720" numCol="1" rtlCol="0" anchor="ctr" anchorCtr="0" compatLnSpc="1">
-                <a:prstTxWarp prst="textNoShape">
-                  <a:avLst/>
-                </a:prstTxWarp>
-              </a:bodyPr>
-              <a:lstStyle/>
-              <a:p>
-                <a:pPr marL="0" marR="0" indent="0" algn="ctr" defTabSz="914400" rtl="0" eaLnBrk="0" fontAlgn="base" latinLnBrk="0" hangingPunct="0">
-                  <a:lnSpc>
-                    <a:spcPct val="100000"/>
-                  </a:lnSpc>
-                  <a:spcBef>
-                    <a:spcPct val="0"/>
-                  </a:spcBef>
-                  <a:spcAft>
-                    <a:spcPct val="0"/>
-                  </a:spcAft>
-                  <a:buClrTx/>
-                  <a:buSzTx/>
-                  <a:buFontTx/>
-                  <a:buNone/>
-                  <a:tabLst/>
-                </a:pPr>
-                <a:r>
-                  <a:rPr kumimoji="0" lang="en-US" sz="1200" b="0" i="1" u="none" strike="noStrike" cap="none" normalizeH="0" baseline="0" dirty="0">
-                    <a:ln>
-                      <a:noFill/>
-                    </a:ln>
-                    <a:solidFill>
-                      <a:schemeClr val="tx2"/>
-                    </a:solidFill>
-                    <a:effectLst/>
-                    <a:latin typeface="Verdana" panose="020B0604030504040204" pitchFamily="34" charset="0"/>
-                    <a:ea typeface="Verdana" panose="020B0604030504040204" pitchFamily="34" charset="0"/>
-                    <a:cs typeface="Verdana" panose="020B0604030504040204" pitchFamily="34" charset="0"/>
-                  </a:rPr>
-                  <a:t>g</a:t>
-                </a:r>
-              </a:p>
-            </p:txBody>
-          </p:sp>
-          <p:sp>
-            <p:nvSpPr>
-              <p:cNvPr id="41" name="Oval 40"/>
-              <p:cNvSpPr/>
-              <p:nvPr/>
-            </p:nvSpPr>
-            <p:spPr bwMode="auto">
-              <a:xfrm>
-                <a:off x="755810" y="2641420"/>
-                <a:ext cx="216284" cy="216284"/>
-              </a:xfrm>
-              <a:prstGeom prst="ellipse">
-                <a:avLst/>
-              </a:prstGeom>
-              <a:solidFill>
-                <a:srgbClr val="CCFFCC"/>
-              </a:solidFill>
-              <a:ln w="12700" cap="flat" cmpd="sng" algn="ctr">
-                <a:solidFill>
-                  <a:schemeClr val="tx1"/>
-                </a:solidFill>
-                <a:prstDash val="solid"/>
-                <a:round/>
-                <a:headEnd type="none" w="sm" len="sm"/>
-                <a:tailEnd type="none" w="sm" len="sm"/>
-              </a:ln>
-              <a:effectLst/>
-            </p:spPr>
-            <p:txBody>
-              <a:bodyPr vert="horz" wrap="square" lIns="91440" tIns="45720" rIns="91440" bIns="45720" numCol="1" rtlCol="0" anchor="ctr" anchorCtr="0" compatLnSpc="1">
-                <a:prstTxWarp prst="textNoShape">
-                  <a:avLst/>
-                </a:prstTxWarp>
-              </a:bodyPr>
-              <a:lstStyle/>
-              <a:p>
-                <a:pPr marL="0" marR="0" indent="0" algn="ctr" defTabSz="914400" rtl="0" eaLnBrk="0" fontAlgn="base" latinLnBrk="0" hangingPunct="0">
-                  <a:lnSpc>
-                    <a:spcPct val="100000"/>
-                  </a:lnSpc>
-                  <a:spcBef>
-                    <a:spcPct val="0"/>
-                  </a:spcBef>
-                  <a:spcAft>
-                    <a:spcPct val="0"/>
-                  </a:spcAft>
-                  <a:buClrTx/>
-                  <a:buSzTx/>
-                  <a:buFontTx/>
-                  <a:buNone/>
-                  <a:tabLst/>
-                </a:pPr>
-                <a:r>
-                  <a:rPr lang="en-US" sz="1200" i="1" dirty="0">
-                    <a:latin typeface="Verdana" panose="020B0604030504040204" pitchFamily="34" charset="0"/>
-                    <a:ea typeface="Verdana" panose="020B0604030504040204" pitchFamily="34" charset="0"/>
-                    <a:cs typeface="Verdana" panose="020B0604030504040204" pitchFamily="34" charset="0"/>
-                  </a:rPr>
-                  <a:t>d</a:t>
-                </a:r>
-                <a:endParaRPr kumimoji="0" lang="en-US" sz="1200" b="0" i="1" u="none" strike="noStrike" cap="none" normalizeH="0" baseline="0" dirty="0">
-                  <a:ln>
-                    <a:noFill/>
-                  </a:ln>
-                  <a:solidFill>
-                    <a:schemeClr val="tx2"/>
-                  </a:solidFill>
-                  <a:effectLst/>
-                  <a:latin typeface="Verdana" panose="020B0604030504040204" pitchFamily="34" charset="0"/>
-                  <a:ea typeface="Verdana" panose="020B0604030504040204" pitchFamily="34" charset="0"/>
-                  <a:cs typeface="Verdana" panose="020B0604030504040204" pitchFamily="34" charset="0"/>
-                </a:endParaRPr>
-              </a:p>
-            </p:txBody>
-          </p:sp>
-          <p:cxnSp>
-            <p:nvCxnSpPr>
-              <p:cNvPr id="42" name="Straight Connector 41"/>
-              <p:cNvCxnSpPr>
-                <a:cxnSpLocks/>
-                <a:stCxn id="40" idx="6"/>
-                <a:endCxn id="14" idx="2"/>
-              </p:cNvCxnSpPr>
-              <p:nvPr/>
-            </p:nvCxnSpPr>
-            <p:spPr bwMode="auto">
-              <a:xfrm>
-                <a:off x="1696945" y="2749562"/>
-                <a:ext cx="533301" cy="0"/>
-              </a:xfrm>
-              <a:prstGeom prst="line">
-                <a:avLst/>
-              </a:prstGeom>
-              <a:solidFill>
-                <a:schemeClr val="accent1"/>
-              </a:solidFill>
-              <a:ln w="12700" cap="flat" cmpd="sng" algn="ctr">
-                <a:solidFill>
-                  <a:schemeClr val="tx1"/>
-                </a:solidFill>
-                <a:prstDash val="solid"/>
-                <a:round/>
-                <a:headEnd type="none" w="sm" len="sm"/>
-                <a:tailEnd type="none" w="sm" len="sm"/>
-              </a:ln>
-              <a:effectLst/>
-            </p:spPr>
-          </p:cxnSp>
-          <p:cxnSp>
-            <p:nvCxnSpPr>
-              <p:cNvPr id="43" name="Straight Connector 42"/>
-              <p:cNvCxnSpPr>
-                <a:cxnSpLocks/>
-                <a:stCxn id="40" idx="2"/>
-                <a:endCxn id="41" idx="6"/>
-              </p:cNvCxnSpPr>
-              <p:nvPr/>
-            </p:nvCxnSpPr>
-            <p:spPr bwMode="auto">
-              <a:xfrm flipH="1">
-                <a:off x="972094" y="2749562"/>
-                <a:ext cx="508567" cy="0"/>
-              </a:xfrm>
-              <a:prstGeom prst="line">
-                <a:avLst/>
-              </a:prstGeom>
-              <a:solidFill>
-                <a:schemeClr val="accent1"/>
-              </a:solidFill>
-              <a:ln w="12700" cap="flat" cmpd="sng" algn="ctr">
-                <a:solidFill>
-                  <a:schemeClr val="tx1"/>
-                </a:solidFill>
-                <a:prstDash val="solid"/>
-                <a:round/>
-                <a:headEnd type="none" w="sm" len="sm"/>
-                <a:tailEnd type="none" w="sm" len="sm"/>
-              </a:ln>
-              <a:effectLst/>
-            </p:spPr>
-          </p:cxnSp>
-          <p:cxnSp>
-            <p:nvCxnSpPr>
-              <p:cNvPr id="44" name="Straight Connector 43"/>
-              <p:cNvCxnSpPr>
-                <a:cxnSpLocks/>
-                <a:stCxn id="38" idx="3"/>
-                <a:endCxn id="13" idx="7"/>
-              </p:cNvCxnSpPr>
-              <p:nvPr/>
-            </p:nvCxnSpPr>
-            <p:spPr bwMode="auto">
-              <a:xfrm flipH="1">
-                <a:off x="1663092" y="1795039"/>
-                <a:ext cx="602023" cy="206302"/>
-              </a:xfrm>
-              <a:prstGeom prst="line">
-                <a:avLst/>
-              </a:prstGeom>
-              <a:solidFill>
-                <a:schemeClr val="accent1"/>
-              </a:solidFill>
-              <a:ln w="12700" cap="flat" cmpd="sng" algn="ctr">
-                <a:solidFill>
-                  <a:schemeClr val="tx1"/>
-                </a:solidFill>
-                <a:prstDash val="solid"/>
-                <a:round/>
-                <a:headEnd type="none" w="sm" len="sm"/>
-                <a:tailEnd type="none" w="sm" len="sm"/>
-              </a:ln>
-              <a:effectLst/>
-            </p:spPr>
-          </p:cxnSp>
-          <p:cxnSp>
-            <p:nvCxnSpPr>
-              <p:cNvPr id="45" name="Straight Connector 44"/>
-              <p:cNvCxnSpPr>
-                <a:cxnSpLocks/>
-                <a:stCxn id="40" idx="0"/>
-                <a:endCxn id="13" idx="4"/>
-              </p:cNvCxnSpPr>
-              <p:nvPr/>
-            </p:nvCxnSpPr>
-            <p:spPr bwMode="auto">
-              <a:xfrm flipH="1" flipV="1">
-                <a:off x="1586624" y="2185951"/>
-                <a:ext cx="2179" cy="455469"/>
-              </a:xfrm>
-              <a:prstGeom prst="line">
-                <a:avLst/>
-              </a:prstGeom>
-              <a:solidFill>
-                <a:schemeClr val="accent1"/>
-              </a:solidFill>
-              <a:ln w="12700" cap="flat" cmpd="sng" algn="ctr">
-                <a:solidFill>
-                  <a:schemeClr val="tx1"/>
-                </a:solidFill>
-                <a:prstDash val="solid"/>
-                <a:round/>
-                <a:headEnd type="none" w="sm" len="sm"/>
-                <a:tailEnd type="none" w="sm" len="sm"/>
-              </a:ln>
-              <a:effectLst/>
-            </p:spPr>
-          </p:cxnSp>
-          <p:cxnSp>
-            <p:nvCxnSpPr>
-              <p:cNvPr id="46" name="Straight Connector 45"/>
-              <p:cNvCxnSpPr>
-                <a:cxnSpLocks/>
-                <a:stCxn id="38" idx="4"/>
-                <a:endCxn id="14" idx="0"/>
-              </p:cNvCxnSpPr>
-              <p:nvPr/>
-            </p:nvCxnSpPr>
-            <p:spPr bwMode="auto">
-              <a:xfrm flipH="1">
-                <a:off x="2338388" y="1826713"/>
-                <a:ext cx="3195" cy="814707"/>
-              </a:xfrm>
-              <a:prstGeom prst="line">
-                <a:avLst/>
-              </a:prstGeom>
-              <a:solidFill>
-                <a:schemeClr val="accent1"/>
-              </a:solidFill>
-              <a:ln w="12700" cap="flat" cmpd="sng" algn="ctr">
-                <a:solidFill>
-                  <a:schemeClr val="tx1"/>
-                </a:solidFill>
-                <a:prstDash val="solid"/>
-                <a:round/>
-                <a:headEnd type="none" w="sm" len="sm"/>
-                <a:tailEnd type="none" w="sm" len="sm"/>
-              </a:ln>
-              <a:effectLst/>
-            </p:spPr>
-          </p:cxnSp>
-          <p:cxnSp>
-            <p:nvCxnSpPr>
-              <p:cNvPr id="47" name="Straight Connector 46"/>
-              <p:cNvCxnSpPr>
-                <a:cxnSpLocks/>
-                <a:stCxn id="39" idx="5"/>
-                <a:endCxn id="36" idx="1"/>
-              </p:cNvCxnSpPr>
-              <p:nvPr/>
-            </p:nvCxnSpPr>
-            <p:spPr bwMode="auto">
-              <a:xfrm>
-                <a:off x="242563" y="1795039"/>
-                <a:ext cx="541928" cy="206302"/>
-              </a:xfrm>
-              <a:prstGeom prst="line">
-                <a:avLst/>
-              </a:prstGeom>
-              <a:solidFill>
-                <a:schemeClr val="accent1"/>
-              </a:solidFill>
-              <a:ln w="12700" cap="flat" cmpd="sng" algn="ctr">
-                <a:solidFill>
-                  <a:schemeClr val="tx1"/>
-                </a:solidFill>
-                <a:prstDash val="solid"/>
-                <a:round/>
-                <a:headEnd type="none" w="sm" len="sm"/>
-                <a:tailEnd type="none" w="sm" len="sm"/>
-              </a:ln>
-              <a:effectLst/>
-            </p:spPr>
-          </p:cxnSp>
-          <p:cxnSp>
-            <p:nvCxnSpPr>
-              <p:cNvPr id="48" name="Straight Connector 47"/>
-              <p:cNvCxnSpPr>
-                <a:cxnSpLocks/>
-                <a:stCxn id="41" idx="2"/>
-                <a:endCxn id="37" idx="6"/>
-              </p:cNvCxnSpPr>
-              <p:nvPr/>
-            </p:nvCxnSpPr>
-            <p:spPr bwMode="auto">
-              <a:xfrm flipH="1">
-                <a:off x="272931" y="2749562"/>
-                <a:ext cx="482879" cy="0"/>
-              </a:xfrm>
-              <a:prstGeom prst="line">
-                <a:avLst/>
-              </a:prstGeom>
-              <a:solidFill>
-                <a:schemeClr val="accent1"/>
-              </a:solidFill>
-              <a:ln w="12700" cap="flat" cmpd="sng" algn="ctr">
-                <a:solidFill>
-                  <a:schemeClr val="tx1"/>
-                </a:solidFill>
-                <a:prstDash val="solid"/>
-                <a:round/>
-                <a:headEnd type="none" w="sm" len="sm"/>
-                <a:tailEnd type="none" w="sm" len="sm"/>
-              </a:ln>
-              <a:effectLst/>
-            </p:spPr>
-          </p:cxnSp>
-          <p:cxnSp>
-            <p:nvCxnSpPr>
-              <p:cNvPr id="49" name="Straight Connector 48"/>
-              <p:cNvCxnSpPr>
-                <a:cxnSpLocks/>
-                <a:stCxn id="37" idx="0"/>
-                <a:endCxn id="39" idx="4"/>
-              </p:cNvCxnSpPr>
-              <p:nvPr/>
-            </p:nvCxnSpPr>
-            <p:spPr bwMode="auto">
-              <a:xfrm flipV="1">
-                <a:off x="164789" y="1826713"/>
-                <a:ext cx="1306" cy="814707"/>
-              </a:xfrm>
-              <a:prstGeom prst="line">
-                <a:avLst/>
-              </a:prstGeom>
-              <a:solidFill>
-                <a:schemeClr val="accent1"/>
-              </a:solidFill>
-              <a:ln w="12700" cap="flat" cmpd="sng" algn="ctr">
-                <a:solidFill>
-                  <a:schemeClr val="tx1"/>
-                </a:solidFill>
-                <a:prstDash val="solid"/>
-                <a:round/>
-                <a:headEnd type="none" w="sm" len="sm"/>
-                <a:tailEnd type="none" w="sm" len="sm"/>
-              </a:ln>
-              <a:effectLst/>
-            </p:spPr>
-          </p:cxnSp>
-          <p:cxnSp>
-            <p:nvCxnSpPr>
-              <p:cNvPr id="50" name="Straight Connector 49"/>
-              <p:cNvCxnSpPr>
-                <a:cxnSpLocks/>
-                <a:stCxn id="36" idx="4"/>
-                <a:endCxn id="41" idx="0"/>
-              </p:cNvCxnSpPr>
-              <p:nvPr/>
-            </p:nvCxnSpPr>
-            <p:spPr bwMode="auto">
-              <a:xfrm>
-                <a:off x="860959" y="2185951"/>
-                <a:ext cx="2993" cy="455469"/>
-              </a:xfrm>
-              <a:prstGeom prst="line">
-                <a:avLst/>
-              </a:prstGeom>
-              <a:solidFill>
-                <a:schemeClr val="accent1"/>
-              </a:solidFill>
-              <a:ln w="12700" cap="flat" cmpd="sng" algn="ctr">
-                <a:solidFill>
-                  <a:schemeClr val="tx1"/>
-                </a:solidFill>
-                <a:prstDash val="solid"/>
-                <a:round/>
-                <a:headEnd type="none" w="sm" len="sm"/>
-                <a:tailEnd type="none" w="sm" len="sm"/>
-              </a:ln>
-              <a:effectLst/>
-            </p:spPr>
-          </p:cxnSp>
-          <p:sp>
-            <p:nvSpPr>
-              <p:cNvPr id="13" name="Oval 12">
-                <a:extLst>
-                  <a:ext uri="{FF2B5EF4-FFF2-40B4-BE49-F238E27FC236}">
-                    <a16:creationId xmlns:a16="http://schemas.microsoft.com/office/drawing/2014/main" id="{B6B114D6-1A93-4A58-671F-BEA7904F16E4}"/>
-                  </a:ext>
-                </a:extLst>
-              </p:cNvPr>
-              <p:cNvSpPr/>
-              <p:nvPr/>
-            </p:nvSpPr>
-            <p:spPr bwMode="auto">
-              <a:xfrm>
-                <a:off x="1478482" y="1969667"/>
-                <a:ext cx="216284" cy="216284"/>
-              </a:xfrm>
-              <a:prstGeom prst="ellipse">
-                <a:avLst/>
-              </a:prstGeom>
-              <a:solidFill>
-                <a:srgbClr val="CCFFCC"/>
-              </a:solidFill>
-              <a:ln w="12700" cap="flat" cmpd="sng" algn="ctr">
-                <a:solidFill>
-                  <a:schemeClr val="tx1"/>
-                </a:solidFill>
-                <a:prstDash val="solid"/>
-                <a:round/>
-                <a:headEnd type="none" w="sm" len="sm"/>
-                <a:tailEnd type="none" w="sm" len="sm"/>
-              </a:ln>
-              <a:effectLst/>
-            </p:spPr>
-            <p:txBody>
-              <a:bodyPr vert="horz" wrap="square" lIns="91440" tIns="45720" rIns="91440" bIns="45720" numCol="1" rtlCol="0" anchor="ctr" anchorCtr="0" compatLnSpc="1">
-                <a:prstTxWarp prst="textNoShape">
-                  <a:avLst/>
-                </a:prstTxWarp>
-              </a:bodyPr>
-              <a:lstStyle/>
-              <a:p>
-                <a:pPr marL="0" marR="0" indent="0" algn="ctr" defTabSz="914400" rtl="0" eaLnBrk="0" fontAlgn="base" latinLnBrk="0" hangingPunct="0">
-                  <a:lnSpc>
-                    <a:spcPct val="100000"/>
-                  </a:lnSpc>
-                  <a:spcBef>
-                    <a:spcPct val="0"/>
-                  </a:spcBef>
-                  <a:spcAft>
-                    <a:spcPct val="0"/>
-                  </a:spcAft>
-                  <a:buClrTx/>
-                  <a:buSzTx/>
-                  <a:buFontTx/>
-                  <a:buNone/>
-                  <a:tabLst/>
-                </a:pPr>
-                <a:r>
-                  <a:rPr kumimoji="0" lang="en-US" sz="1200" b="0" i="1" u="none" strike="noStrike" cap="none" normalizeH="0" baseline="0" dirty="0">
-                    <a:ln>
-                      <a:noFill/>
-                    </a:ln>
-                    <a:solidFill>
-                      <a:schemeClr val="tx2"/>
-                    </a:solidFill>
-                    <a:effectLst/>
-                    <a:latin typeface="Verdana" panose="020B0604030504040204" pitchFamily="34" charset="0"/>
-                    <a:ea typeface="Verdana" panose="020B0604030504040204" pitchFamily="34" charset="0"/>
-                    <a:cs typeface="Verdana" panose="020B0604030504040204" pitchFamily="34" charset="0"/>
-                  </a:rPr>
-                  <a:t>e</a:t>
-                </a:r>
-              </a:p>
-            </p:txBody>
-          </p:sp>
-          <p:sp>
-            <p:nvSpPr>
-              <p:cNvPr id="14" name="Oval 13">
-                <a:extLst>
-                  <a:ext uri="{FF2B5EF4-FFF2-40B4-BE49-F238E27FC236}">
-                    <a16:creationId xmlns:a16="http://schemas.microsoft.com/office/drawing/2014/main" id="{A3D6276F-CF95-8D5A-2267-483DAAF89F1C}"/>
-                  </a:ext>
-                </a:extLst>
-              </p:cNvPr>
-              <p:cNvSpPr/>
-              <p:nvPr/>
-            </p:nvSpPr>
-            <p:spPr bwMode="auto">
-              <a:xfrm>
-                <a:off x="2230246" y="2641420"/>
-                <a:ext cx="216284" cy="216284"/>
-              </a:xfrm>
-              <a:prstGeom prst="ellipse">
-                <a:avLst/>
-              </a:prstGeom>
-              <a:solidFill>
-                <a:srgbClr val="CCFFCC"/>
-              </a:solidFill>
-              <a:ln w="12700" cap="flat" cmpd="sng" algn="ctr">
-                <a:solidFill>
-                  <a:schemeClr val="tx1"/>
-                </a:solidFill>
-                <a:prstDash val="solid"/>
-                <a:round/>
-                <a:headEnd type="none" w="sm" len="sm"/>
-                <a:tailEnd type="none" w="sm" len="sm"/>
-              </a:ln>
-              <a:effectLst/>
-            </p:spPr>
-            <p:txBody>
-              <a:bodyPr vert="horz" wrap="square" lIns="91440" tIns="45720" rIns="91440" bIns="45720" numCol="1" rtlCol="0" anchor="ctr" anchorCtr="0" compatLnSpc="1">
-                <a:prstTxWarp prst="textNoShape">
-                  <a:avLst/>
-                </a:prstTxWarp>
-              </a:bodyPr>
-              <a:lstStyle/>
-              <a:p>
-                <a:pPr marL="0" marR="0" indent="0" algn="ctr" defTabSz="914400" rtl="0" eaLnBrk="0" fontAlgn="base" latinLnBrk="0" hangingPunct="0">
-                  <a:lnSpc>
-                    <a:spcPct val="100000"/>
-                  </a:lnSpc>
-                  <a:spcBef>
-                    <a:spcPct val="0"/>
-                  </a:spcBef>
-                  <a:spcAft>
-                    <a:spcPct val="0"/>
-                  </a:spcAft>
-                  <a:buClrTx/>
-                  <a:buSzTx/>
-                  <a:buFontTx/>
-                  <a:buNone/>
-                  <a:tabLst/>
-                </a:pPr>
-                <a:r>
-                  <a:rPr kumimoji="0" lang="en-US" sz="1200" b="0" i="1" u="none" strike="noStrike" cap="none" normalizeH="0" baseline="0" dirty="0">
-                    <a:ln>
-                      <a:noFill/>
-                    </a:ln>
-                    <a:solidFill>
-                      <a:schemeClr val="tx2"/>
-                    </a:solidFill>
-                    <a:effectLst/>
-                    <a:latin typeface="Verdana" panose="020B0604030504040204" pitchFamily="34" charset="0"/>
-                    <a:ea typeface="Verdana" panose="020B0604030504040204" pitchFamily="34" charset="0"/>
-                    <a:cs typeface="Verdana" panose="020B0604030504040204" pitchFamily="34" charset="0"/>
-                  </a:rPr>
-                  <a:t>h</a:t>
-                </a:r>
-              </a:p>
-            </p:txBody>
-          </p:sp>
-          <p:cxnSp>
-            <p:nvCxnSpPr>
-              <p:cNvPr id="2" name="Straight Connector 1">
-                <a:extLst>
-                  <a:ext uri="{FF2B5EF4-FFF2-40B4-BE49-F238E27FC236}">
-                    <a16:creationId xmlns:a16="http://schemas.microsoft.com/office/drawing/2014/main" id="{F24AB0DD-736D-26D3-D587-A0F7543B6884}"/>
-                  </a:ext>
-                </a:extLst>
-              </p:cNvPr>
-              <p:cNvCxnSpPr>
-                <a:cxnSpLocks/>
-                <a:stCxn id="39" idx="6"/>
-                <a:endCxn id="38" idx="2"/>
-              </p:cNvCxnSpPr>
-              <p:nvPr/>
-            </p:nvCxnSpPr>
-            <p:spPr bwMode="auto">
-              <a:xfrm>
-                <a:off x="274237" y="1718571"/>
-                <a:ext cx="1959204" cy="0"/>
-              </a:xfrm>
-              <a:prstGeom prst="line">
-                <a:avLst/>
-              </a:prstGeom>
-              <a:solidFill>
-                <a:schemeClr val="accent1"/>
-              </a:solidFill>
-              <a:ln w="12700" cap="flat" cmpd="sng" algn="ctr">
-                <a:solidFill>
-                  <a:schemeClr val="tx1"/>
-                </a:solidFill>
-                <a:prstDash val="solid"/>
-                <a:round/>
-                <a:headEnd type="none" w="sm" len="sm"/>
-                <a:tailEnd type="none" w="sm" len="sm"/>
-              </a:ln>
-              <a:effectLst/>
-            </p:spPr>
-          </p:cxnSp>
-        </p:grpSp>
-        <p:grpSp>
-          <p:nvGrpSpPr>
-            <p:cNvPr id="429094" name="Group 429093">
-              <a:extLst>
-                <a:ext uri="{FF2B5EF4-FFF2-40B4-BE49-F238E27FC236}">
-                  <a16:creationId xmlns:a16="http://schemas.microsoft.com/office/drawing/2014/main" id="{081EDE4A-34CE-6210-F6F9-325E2739F4B7}"/>
-                </a:ext>
-              </a:extLst>
-            </p:cNvPr>
-            <p:cNvGrpSpPr/>
-            <p:nvPr/>
-          </p:nvGrpSpPr>
-          <p:grpSpPr>
-            <a:xfrm>
-              <a:off x="7388456" y="1590678"/>
-              <a:ext cx="2375144" cy="1267026"/>
-              <a:chOff x="7388456" y="1590678"/>
-              <a:chExt cx="2375144" cy="1267026"/>
-            </a:xfrm>
-          </p:grpSpPr>
-          <p:sp>
-            <p:nvSpPr>
-              <p:cNvPr id="429066" name="Oval 429065">
-                <a:extLst>
-                  <a:ext uri="{FF2B5EF4-FFF2-40B4-BE49-F238E27FC236}">
-                    <a16:creationId xmlns:a16="http://schemas.microsoft.com/office/drawing/2014/main" id="{8427D67F-34AE-FE09-0B14-9503DF261739}"/>
-                  </a:ext>
-                </a:extLst>
-              </p:cNvPr>
-              <p:cNvSpPr/>
-              <p:nvPr/>
-            </p:nvSpPr>
-            <p:spPr bwMode="auto">
-              <a:xfrm>
-                <a:off x="8084626" y="1949916"/>
-                <a:ext cx="216284" cy="216284"/>
-              </a:xfrm>
-              <a:prstGeom prst="ellipse">
-                <a:avLst/>
-              </a:prstGeom>
-              <a:solidFill>
-                <a:srgbClr val="CCFFFF"/>
-              </a:solidFill>
-              <a:ln w="12700" cap="flat" cmpd="sng" algn="ctr">
-                <a:solidFill>
-                  <a:schemeClr val="tx1"/>
-                </a:solidFill>
-                <a:prstDash val="solid"/>
-                <a:round/>
-                <a:headEnd type="none" w="sm" len="sm"/>
-                <a:tailEnd type="none" w="sm" len="sm"/>
-              </a:ln>
-              <a:effectLst/>
-            </p:spPr>
-            <p:txBody>
-              <a:bodyPr vert="horz" wrap="square" lIns="91440" tIns="45720" rIns="91440" bIns="45720" numCol="1" rtlCol="0" anchor="ctr" anchorCtr="0" compatLnSpc="1">
-                <a:prstTxWarp prst="textNoShape">
-                  <a:avLst/>
-                </a:prstTxWarp>
-              </a:bodyPr>
-              <a:lstStyle/>
-              <a:p>
-                <a:pPr marL="0" marR="0" indent="0" algn="ctr" defTabSz="914400" rtl="0" eaLnBrk="0" fontAlgn="base" latinLnBrk="0" hangingPunct="0">
-                  <a:lnSpc>
-                    <a:spcPct val="100000"/>
-                  </a:lnSpc>
-                  <a:spcBef>
-                    <a:spcPct val="0"/>
-                  </a:spcBef>
-                  <a:spcAft>
-                    <a:spcPct val="0"/>
-                  </a:spcAft>
-                  <a:buClrTx/>
-                  <a:buSzTx/>
-                  <a:buFontTx/>
-                  <a:buNone/>
-                  <a:tabLst/>
-                </a:pPr>
-                <a:r>
-                  <a:rPr kumimoji="0" lang="en-US" sz="1200" b="0" i="1" u="none" strike="noStrike" cap="none" normalizeH="0" baseline="0" dirty="0">
-                    <a:ln>
-                      <a:noFill/>
-                    </a:ln>
-                    <a:solidFill>
-                      <a:schemeClr val="tx2"/>
-                    </a:solidFill>
-                    <a:effectLst/>
-                    <a:latin typeface="Verdana" panose="020B0604030504040204" pitchFamily="34" charset="0"/>
-                    <a:ea typeface="Verdana" panose="020B0604030504040204" pitchFamily="34" charset="0"/>
-                    <a:cs typeface="Verdana" panose="020B0604030504040204" pitchFamily="34" charset="0"/>
-                  </a:rPr>
-                  <a:t>b</a:t>
-                </a:r>
-              </a:p>
-            </p:txBody>
-          </p:sp>
-          <p:sp>
-            <p:nvSpPr>
-              <p:cNvPr id="429067" name="Oval 429066">
-                <a:extLst>
-                  <a:ext uri="{FF2B5EF4-FFF2-40B4-BE49-F238E27FC236}">
-                    <a16:creationId xmlns:a16="http://schemas.microsoft.com/office/drawing/2014/main" id="{32FEA0BF-1B52-36ED-4C4C-68A90D748BE7}"/>
-                  </a:ext>
-                </a:extLst>
-              </p:cNvPr>
-              <p:cNvSpPr/>
-              <p:nvPr/>
-            </p:nvSpPr>
-            <p:spPr bwMode="auto">
-              <a:xfrm>
-                <a:off x="7388456" y="2621669"/>
-                <a:ext cx="216284" cy="216284"/>
-              </a:xfrm>
-              <a:prstGeom prst="ellipse">
-                <a:avLst/>
-              </a:prstGeom>
-              <a:solidFill>
-                <a:srgbClr val="CCFFFF"/>
-              </a:solidFill>
-              <a:ln w="12700" cap="flat" cmpd="sng" algn="ctr">
-                <a:solidFill>
-                  <a:schemeClr val="tx1"/>
-                </a:solidFill>
-                <a:prstDash val="solid"/>
-                <a:round/>
-                <a:headEnd type="none" w="sm" len="sm"/>
-                <a:tailEnd type="none" w="sm" len="sm"/>
-              </a:ln>
-              <a:effectLst/>
-            </p:spPr>
-            <p:txBody>
-              <a:bodyPr vert="horz" wrap="square" lIns="91440" tIns="45720" rIns="91440" bIns="45720" numCol="1" rtlCol="0" anchor="ctr" anchorCtr="0" compatLnSpc="1">
-                <a:prstTxWarp prst="textNoShape">
-                  <a:avLst/>
-                </a:prstTxWarp>
-              </a:bodyPr>
-              <a:lstStyle/>
-              <a:p>
-                <a:pPr marL="0" marR="0" indent="0" algn="ctr" defTabSz="914400" rtl="0" eaLnBrk="0" fontAlgn="base" latinLnBrk="0" hangingPunct="0">
-                  <a:lnSpc>
-                    <a:spcPct val="100000"/>
-                  </a:lnSpc>
-                  <a:spcBef>
-                    <a:spcPct val="0"/>
-                  </a:spcBef>
-                  <a:spcAft>
-                    <a:spcPct val="0"/>
-                  </a:spcAft>
-                  <a:buClrTx/>
-                  <a:buSzTx/>
-                  <a:buFontTx/>
-                  <a:buNone/>
-                  <a:tabLst/>
-                </a:pPr>
-                <a:r>
-                  <a:rPr kumimoji="0" lang="en-US" sz="1200" b="0" i="1" u="none" strike="noStrike" cap="none" normalizeH="0" baseline="0" dirty="0">
-                    <a:ln>
-                      <a:noFill/>
-                    </a:ln>
-                    <a:solidFill>
-                      <a:schemeClr val="tx2"/>
-                    </a:solidFill>
-                    <a:effectLst/>
-                    <a:latin typeface="Verdana" panose="020B0604030504040204" pitchFamily="34" charset="0"/>
-                    <a:ea typeface="Verdana" panose="020B0604030504040204" pitchFamily="34" charset="0"/>
-                    <a:cs typeface="Verdana" panose="020B0604030504040204" pitchFamily="34" charset="0"/>
-                  </a:rPr>
-                  <a:t>c</a:t>
-                </a:r>
-              </a:p>
-            </p:txBody>
-          </p:sp>
-          <p:sp>
-            <p:nvSpPr>
-              <p:cNvPr id="429069" name="Oval 429068">
-                <a:extLst>
-                  <a:ext uri="{FF2B5EF4-FFF2-40B4-BE49-F238E27FC236}">
-                    <a16:creationId xmlns:a16="http://schemas.microsoft.com/office/drawing/2014/main" id="{B57405E1-27AF-5E69-CBFA-FBA7825E19AD}"/>
-                  </a:ext>
-                </a:extLst>
-              </p:cNvPr>
-              <p:cNvSpPr/>
-              <p:nvPr/>
-            </p:nvSpPr>
-            <p:spPr bwMode="auto">
-              <a:xfrm>
-                <a:off x="7389762" y="1590678"/>
-                <a:ext cx="216284" cy="216284"/>
-              </a:xfrm>
-              <a:prstGeom prst="ellipse">
-                <a:avLst/>
-              </a:prstGeom>
-              <a:solidFill>
-                <a:srgbClr val="CCFFCC"/>
-              </a:solidFill>
-              <a:ln w="12700" cap="flat" cmpd="sng" algn="ctr">
-                <a:solidFill>
-                  <a:schemeClr val="tx1"/>
-                </a:solidFill>
-                <a:prstDash val="solid"/>
-                <a:round/>
-                <a:headEnd type="none" w="sm" len="sm"/>
-                <a:tailEnd type="none" w="sm" len="sm"/>
-              </a:ln>
-              <a:effectLst/>
-            </p:spPr>
-            <p:txBody>
-              <a:bodyPr vert="horz" wrap="square" lIns="91440" tIns="45720" rIns="91440" bIns="45720" numCol="1" rtlCol="0" anchor="ctr" anchorCtr="0" compatLnSpc="1">
-                <a:prstTxWarp prst="textNoShape">
-                  <a:avLst/>
-                </a:prstTxWarp>
-              </a:bodyPr>
-              <a:lstStyle/>
-              <a:p>
-                <a:pPr marL="0" marR="0" indent="0" algn="ctr" defTabSz="914400" rtl="0" eaLnBrk="0" fontAlgn="base" latinLnBrk="0" hangingPunct="0">
-                  <a:lnSpc>
-                    <a:spcPct val="100000"/>
-                  </a:lnSpc>
-                  <a:spcBef>
-                    <a:spcPct val="0"/>
-                  </a:spcBef>
-                  <a:spcAft>
-                    <a:spcPct val="0"/>
-                  </a:spcAft>
-                  <a:buClrTx/>
-                  <a:buSzTx/>
-                  <a:buFontTx/>
-                  <a:buNone/>
-                  <a:tabLst/>
-                </a:pPr>
-                <a:r>
-                  <a:rPr kumimoji="0" lang="en-US" sz="1200" b="0" i="1" u="none" strike="noStrike" cap="none" normalizeH="0" baseline="0" dirty="0">
-                    <a:ln>
-                      <a:noFill/>
-                    </a:ln>
-                    <a:solidFill>
-                      <a:schemeClr val="tx2"/>
-                    </a:solidFill>
-                    <a:effectLst/>
-                    <a:latin typeface="Verdana" panose="020B0604030504040204" pitchFamily="34" charset="0"/>
-                    <a:ea typeface="Verdana" panose="020B0604030504040204" pitchFamily="34" charset="0"/>
-                    <a:cs typeface="Verdana" panose="020B0604030504040204" pitchFamily="34" charset="0"/>
-                  </a:rPr>
-                  <a:t>a</a:t>
-                </a:r>
-              </a:p>
-            </p:txBody>
-          </p:sp>
-          <p:sp>
-            <p:nvSpPr>
-              <p:cNvPr id="429071" name="Oval 429070">
-                <a:extLst>
-                  <a:ext uri="{FF2B5EF4-FFF2-40B4-BE49-F238E27FC236}">
-                    <a16:creationId xmlns:a16="http://schemas.microsoft.com/office/drawing/2014/main" id="{DE53B3D0-3929-A3AE-AC70-6FE08B2F481C}"/>
-                  </a:ext>
-                </a:extLst>
-              </p:cNvPr>
-              <p:cNvSpPr/>
-              <p:nvPr/>
-            </p:nvSpPr>
-            <p:spPr bwMode="auto">
-              <a:xfrm>
-                <a:off x="8087619" y="2621669"/>
-                <a:ext cx="216284" cy="216284"/>
-              </a:xfrm>
-              <a:prstGeom prst="ellipse">
-                <a:avLst/>
-              </a:prstGeom>
-              <a:solidFill>
-                <a:srgbClr val="CCFFCC"/>
-              </a:solidFill>
-              <a:ln w="12700" cap="flat" cmpd="sng" algn="ctr">
-                <a:solidFill>
-                  <a:schemeClr val="tx1"/>
-                </a:solidFill>
-                <a:prstDash val="solid"/>
-                <a:round/>
-                <a:headEnd type="none" w="sm" len="sm"/>
-                <a:tailEnd type="none" w="sm" len="sm"/>
-              </a:ln>
-              <a:effectLst/>
-            </p:spPr>
-            <p:txBody>
-              <a:bodyPr vert="horz" wrap="square" lIns="91440" tIns="45720" rIns="91440" bIns="45720" numCol="1" rtlCol="0" anchor="ctr" anchorCtr="0" compatLnSpc="1">
-                <a:prstTxWarp prst="textNoShape">
-                  <a:avLst/>
-                </a:prstTxWarp>
-              </a:bodyPr>
-              <a:lstStyle/>
-              <a:p>
-                <a:pPr marL="0" marR="0" indent="0" algn="ctr" defTabSz="914400" rtl="0" eaLnBrk="0" fontAlgn="base" latinLnBrk="0" hangingPunct="0">
-                  <a:lnSpc>
-                    <a:spcPct val="100000"/>
-                  </a:lnSpc>
-                  <a:spcBef>
-                    <a:spcPct val="0"/>
-                  </a:spcBef>
-                  <a:spcAft>
-                    <a:spcPct val="0"/>
-                  </a:spcAft>
-                  <a:buClrTx/>
-                  <a:buSzTx/>
-                  <a:buFontTx/>
-                  <a:buNone/>
-                  <a:tabLst/>
-                </a:pPr>
-                <a:r>
-                  <a:rPr lang="en-US" sz="1200" i="1" dirty="0">
-                    <a:latin typeface="Verdana" panose="020B0604030504040204" pitchFamily="34" charset="0"/>
-                    <a:ea typeface="Verdana" panose="020B0604030504040204" pitchFamily="34" charset="0"/>
-                    <a:cs typeface="Verdana" panose="020B0604030504040204" pitchFamily="34" charset="0"/>
-                  </a:rPr>
-                  <a:t>d</a:t>
-                </a:r>
-                <a:endParaRPr kumimoji="0" lang="en-US" sz="1200" b="0" i="1" u="none" strike="noStrike" cap="none" normalizeH="0" baseline="0" dirty="0">
-                  <a:ln>
-                    <a:noFill/>
-                  </a:ln>
-                  <a:solidFill>
-                    <a:schemeClr val="tx2"/>
-                  </a:solidFill>
-                  <a:effectLst/>
-                  <a:latin typeface="Verdana" panose="020B0604030504040204" pitchFamily="34" charset="0"/>
-                  <a:ea typeface="Verdana" panose="020B0604030504040204" pitchFamily="34" charset="0"/>
-                  <a:cs typeface="Verdana" panose="020B0604030504040204" pitchFamily="34" charset="0"/>
-                </a:endParaRPr>
-              </a:p>
-            </p:txBody>
-          </p:sp>
-          <p:cxnSp>
-            <p:nvCxnSpPr>
-              <p:cNvPr id="429073" name="Straight Connector 429072">
-                <a:extLst>
-                  <a:ext uri="{FF2B5EF4-FFF2-40B4-BE49-F238E27FC236}">
-                    <a16:creationId xmlns:a16="http://schemas.microsoft.com/office/drawing/2014/main" id="{95285D66-EB10-4AD5-D574-5452BC3682FD}"/>
-                  </a:ext>
-                </a:extLst>
-              </p:cNvPr>
-              <p:cNvCxnSpPr>
-                <a:cxnSpLocks/>
-                <a:stCxn id="429069" idx="5"/>
-                <a:endCxn id="429066" idx="1"/>
-              </p:cNvCxnSpPr>
-              <p:nvPr/>
-            </p:nvCxnSpPr>
-            <p:spPr bwMode="auto">
-              <a:xfrm>
-                <a:off x="7574372" y="1775288"/>
-                <a:ext cx="541928" cy="206302"/>
-              </a:xfrm>
-              <a:prstGeom prst="line">
-                <a:avLst/>
-              </a:prstGeom>
-              <a:solidFill>
-                <a:schemeClr val="accent1"/>
-              </a:solidFill>
-              <a:ln w="12700" cap="flat" cmpd="sng" algn="ctr">
-                <a:solidFill>
-                  <a:schemeClr val="tx1"/>
-                </a:solidFill>
-                <a:prstDash val="solid"/>
-                <a:round/>
-                <a:headEnd type="none" w="sm" len="sm"/>
-                <a:tailEnd type="none" w="sm" len="sm"/>
-              </a:ln>
-              <a:effectLst/>
-            </p:spPr>
-          </p:cxnSp>
-          <p:cxnSp>
-            <p:nvCxnSpPr>
-              <p:cNvPr id="429074" name="Straight Connector 429073">
-                <a:extLst>
-                  <a:ext uri="{FF2B5EF4-FFF2-40B4-BE49-F238E27FC236}">
-                    <a16:creationId xmlns:a16="http://schemas.microsoft.com/office/drawing/2014/main" id="{FEE6BBAB-2910-90D4-373A-4C11DAAB9E27}"/>
-                  </a:ext>
-                </a:extLst>
-              </p:cNvPr>
-              <p:cNvCxnSpPr>
-                <a:cxnSpLocks/>
-                <a:stCxn id="429071" idx="2"/>
-                <a:endCxn id="429067" idx="6"/>
-              </p:cNvCxnSpPr>
-              <p:nvPr/>
-            </p:nvCxnSpPr>
-            <p:spPr bwMode="auto">
-              <a:xfrm flipH="1">
-                <a:off x="7604740" y="2729811"/>
-                <a:ext cx="482879" cy="0"/>
-              </a:xfrm>
-              <a:prstGeom prst="line">
-                <a:avLst/>
-              </a:prstGeom>
-              <a:solidFill>
-                <a:schemeClr val="accent1"/>
-              </a:solidFill>
-              <a:ln w="44450" cap="flat" cmpd="sng" algn="ctr">
-                <a:solidFill>
-                  <a:schemeClr val="tx1"/>
-                </a:solidFill>
-                <a:prstDash val="solid"/>
-                <a:round/>
-                <a:headEnd type="none" w="sm" len="sm"/>
-                <a:tailEnd type="none" w="sm" len="sm"/>
-              </a:ln>
-              <a:effectLst/>
-            </p:spPr>
-          </p:cxnSp>
-          <p:cxnSp>
-            <p:nvCxnSpPr>
-              <p:cNvPr id="429075" name="Straight Connector 429074">
-                <a:extLst>
-                  <a:ext uri="{FF2B5EF4-FFF2-40B4-BE49-F238E27FC236}">
-                    <a16:creationId xmlns:a16="http://schemas.microsoft.com/office/drawing/2014/main" id="{019E5F40-4E59-B6C5-1CE0-ACB7A86688CB}"/>
-                  </a:ext>
-                </a:extLst>
-              </p:cNvPr>
-              <p:cNvCxnSpPr>
-                <a:cxnSpLocks/>
-                <a:stCxn id="429067" idx="0"/>
-                <a:endCxn id="429069" idx="4"/>
-              </p:cNvCxnSpPr>
-              <p:nvPr/>
-            </p:nvCxnSpPr>
-            <p:spPr bwMode="auto">
-              <a:xfrm flipV="1">
-                <a:off x="7496598" y="1806962"/>
-                <a:ext cx="1306" cy="814707"/>
-              </a:xfrm>
-              <a:prstGeom prst="line">
-                <a:avLst/>
-              </a:prstGeom>
-              <a:solidFill>
-                <a:schemeClr val="accent1"/>
-              </a:solidFill>
-              <a:ln w="12700" cap="flat" cmpd="sng" algn="ctr">
-                <a:solidFill>
-                  <a:schemeClr val="tx1"/>
-                </a:solidFill>
-                <a:prstDash val="solid"/>
-                <a:round/>
-                <a:headEnd type="none" w="sm" len="sm"/>
-                <a:tailEnd type="none" w="sm" len="sm"/>
-              </a:ln>
-              <a:effectLst/>
-            </p:spPr>
-          </p:cxnSp>
-          <p:cxnSp>
-            <p:nvCxnSpPr>
-              <p:cNvPr id="429076" name="Straight Connector 429075">
-                <a:extLst>
-                  <a:ext uri="{FF2B5EF4-FFF2-40B4-BE49-F238E27FC236}">
-                    <a16:creationId xmlns:a16="http://schemas.microsoft.com/office/drawing/2014/main" id="{D1AAD9D5-444F-661A-0CA9-9D9574C4FDEF}"/>
-                  </a:ext>
-                </a:extLst>
-              </p:cNvPr>
-              <p:cNvCxnSpPr>
-                <a:cxnSpLocks/>
-                <a:stCxn id="429066" idx="4"/>
-                <a:endCxn id="429071" idx="0"/>
-              </p:cNvCxnSpPr>
-              <p:nvPr/>
-            </p:nvCxnSpPr>
-            <p:spPr bwMode="auto">
-              <a:xfrm>
-                <a:off x="8192768" y="2166200"/>
-                <a:ext cx="2993" cy="455469"/>
-              </a:xfrm>
-              <a:prstGeom prst="line">
-                <a:avLst/>
-              </a:prstGeom>
-              <a:solidFill>
-                <a:schemeClr val="accent1"/>
-              </a:solidFill>
-              <a:ln w="12700" cap="flat" cmpd="sng" algn="ctr">
-                <a:solidFill>
-                  <a:schemeClr val="tx1"/>
-                </a:solidFill>
-                <a:prstDash val="solid"/>
-                <a:round/>
-                <a:headEnd type="none" w="sm" len="sm"/>
-                <a:tailEnd type="none" w="sm" len="sm"/>
-              </a:ln>
-              <a:effectLst/>
-            </p:spPr>
-          </p:cxnSp>
-          <p:sp>
-            <p:nvSpPr>
-              <p:cNvPr id="429078" name="Oval 429077">
-                <a:extLst>
-                  <a:ext uri="{FF2B5EF4-FFF2-40B4-BE49-F238E27FC236}">
-                    <a16:creationId xmlns:a16="http://schemas.microsoft.com/office/drawing/2014/main" id="{0A1772D8-EB91-C7CA-51B9-099A09C8A9AF}"/>
-                  </a:ext>
-                </a:extLst>
-              </p:cNvPr>
-              <p:cNvSpPr/>
-              <p:nvPr/>
-            </p:nvSpPr>
-            <p:spPr bwMode="auto">
-              <a:xfrm>
-                <a:off x="9547316" y="1599543"/>
-                <a:ext cx="216284" cy="216284"/>
-              </a:xfrm>
-              <a:prstGeom prst="ellipse">
-                <a:avLst/>
-              </a:prstGeom>
-              <a:solidFill>
-                <a:srgbClr val="CCFFFF"/>
-              </a:solidFill>
-              <a:ln w="12700" cap="flat" cmpd="sng" algn="ctr">
-                <a:solidFill>
-                  <a:schemeClr val="tx1"/>
-                </a:solidFill>
-                <a:prstDash val="solid"/>
-                <a:round/>
-                <a:headEnd type="none" w="sm" len="sm"/>
-                <a:tailEnd type="none" w="sm" len="sm"/>
-              </a:ln>
-              <a:effectLst/>
-            </p:spPr>
-            <p:txBody>
-              <a:bodyPr vert="horz" wrap="square" lIns="91440" tIns="45720" rIns="91440" bIns="45720" numCol="1" rtlCol="0" anchor="ctr" anchorCtr="0" compatLnSpc="1">
-                <a:prstTxWarp prst="textNoShape">
-                  <a:avLst/>
-                </a:prstTxWarp>
-              </a:bodyPr>
-              <a:lstStyle/>
-              <a:p>
-                <a:pPr marL="0" marR="0" indent="0" algn="ctr" defTabSz="914400" rtl="0" eaLnBrk="0" fontAlgn="base" latinLnBrk="0" hangingPunct="0">
-                  <a:lnSpc>
-                    <a:spcPct val="100000"/>
-                  </a:lnSpc>
-                  <a:spcBef>
-                    <a:spcPct val="0"/>
-                  </a:spcBef>
-                  <a:spcAft>
-                    <a:spcPct val="0"/>
-                  </a:spcAft>
-                  <a:buClrTx/>
-                  <a:buSzTx/>
-                  <a:buFontTx/>
-                  <a:buNone/>
-                  <a:tabLst/>
-                </a:pPr>
-                <a:r>
-                  <a:rPr kumimoji="0" lang="en-US" sz="1200" b="0" i="1" u="none" strike="noStrike" cap="none" normalizeH="0" baseline="0" dirty="0">
-                    <a:ln>
-                      <a:noFill/>
-                    </a:ln>
-                    <a:solidFill>
-                      <a:schemeClr val="tx2"/>
-                    </a:solidFill>
-                    <a:effectLst/>
-                    <a:latin typeface="Verdana" panose="020B0604030504040204" pitchFamily="34" charset="0"/>
-                    <a:ea typeface="Verdana" panose="020B0604030504040204" pitchFamily="34" charset="0"/>
-                    <a:cs typeface="Verdana" panose="020B0604030504040204" pitchFamily="34" charset="0"/>
-                  </a:rPr>
-                  <a:t>f</a:t>
-                </a:r>
-              </a:p>
-            </p:txBody>
-          </p:sp>
-          <p:sp>
-            <p:nvSpPr>
-              <p:cNvPr id="429080" name="Oval 429079">
-                <a:extLst>
-                  <a:ext uri="{FF2B5EF4-FFF2-40B4-BE49-F238E27FC236}">
-                    <a16:creationId xmlns:a16="http://schemas.microsoft.com/office/drawing/2014/main" id="{5DACDF88-E9FC-6515-EBEE-59D82E41EB44}"/>
-                  </a:ext>
-                </a:extLst>
-              </p:cNvPr>
-              <p:cNvSpPr/>
-              <p:nvPr/>
-            </p:nvSpPr>
-            <p:spPr bwMode="auto">
-              <a:xfrm>
-                <a:off x="8794536" y="2641420"/>
-                <a:ext cx="216284" cy="216284"/>
-              </a:xfrm>
-              <a:prstGeom prst="ellipse">
-                <a:avLst/>
-              </a:prstGeom>
-              <a:solidFill>
-                <a:srgbClr val="CCFFFF"/>
-              </a:solidFill>
-              <a:ln w="12700" cap="flat" cmpd="sng" algn="ctr">
-                <a:solidFill>
-                  <a:schemeClr val="tx1"/>
-                </a:solidFill>
-                <a:prstDash val="solid"/>
-                <a:round/>
-                <a:headEnd type="none" w="sm" len="sm"/>
-                <a:tailEnd type="none" w="sm" len="sm"/>
-              </a:ln>
-              <a:effectLst/>
-            </p:spPr>
-            <p:txBody>
-              <a:bodyPr vert="horz" wrap="square" lIns="91440" tIns="45720" rIns="91440" bIns="45720" numCol="1" rtlCol="0" anchor="ctr" anchorCtr="0" compatLnSpc="1">
-                <a:prstTxWarp prst="textNoShape">
-                  <a:avLst/>
-                </a:prstTxWarp>
-              </a:bodyPr>
-              <a:lstStyle/>
-              <a:p>
-                <a:pPr marL="0" marR="0" indent="0" algn="ctr" defTabSz="914400" rtl="0" eaLnBrk="0" fontAlgn="base" latinLnBrk="0" hangingPunct="0">
-                  <a:lnSpc>
-                    <a:spcPct val="100000"/>
-                  </a:lnSpc>
-                  <a:spcBef>
-                    <a:spcPct val="0"/>
-                  </a:spcBef>
-                  <a:spcAft>
-                    <a:spcPct val="0"/>
-                  </a:spcAft>
-                  <a:buClrTx/>
-                  <a:buSzTx/>
-                  <a:buFontTx/>
-                  <a:buNone/>
-                  <a:tabLst/>
-                </a:pPr>
-                <a:r>
-                  <a:rPr kumimoji="0" lang="en-US" sz="1200" b="0" i="1" u="none" strike="noStrike" cap="none" normalizeH="0" baseline="0" dirty="0">
-                    <a:ln>
-                      <a:noFill/>
-                    </a:ln>
-                    <a:solidFill>
-                      <a:schemeClr val="tx2"/>
-                    </a:solidFill>
-                    <a:effectLst/>
-                    <a:latin typeface="Verdana" panose="020B0604030504040204" pitchFamily="34" charset="0"/>
-                    <a:ea typeface="Verdana" panose="020B0604030504040204" pitchFamily="34" charset="0"/>
-                    <a:cs typeface="Verdana" panose="020B0604030504040204" pitchFamily="34" charset="0"/>
-                  </a:rPr>
-                  <a:t>g</a:t>
-                </a:r>
-              </a:p>
-            </p:txBody>
-          </p:sp>
-          <p:cxnSp>
-            <p:nvCxnSpPr>
-              <p:cNvPr id="429082" name="Straight Connector 429081">
-                <a:extLst>
-                  <a:ext uri="{FF2B5EF4-FFF2-40B4-BE49-F238E27FC236}">
-                    <a16:creationId xmlns:a16="http://schemas.microsoft.com/office/drawing/2014/main" id="{E6E3A598-62B3-A14E-C3CD-AFCAB94820AB}"/>
-                  </a:ext>
-                </a:extLst>
-              </p:cNvPr>
-              <p:cNvCxnSpPr>
-                <a:cxnSpLocks/>
-                <a:stCxn id="429080" idx="6"/>
-                <a:endCxn id="429088" idx="2"/>
-              </p:cNvCxnSpPr>
-              <p:nvPr/>
-            </p:nvCxnSpPr>
-            <p:spPr bwMode="auto">
-              <a:xfrm>
-                <a:off x="9010820" y="2749562"/>
-                <a:ext cx="533301" cy="0"/>
-              </a:xfrm>
-              <a:prstGeom prst="line">
-                <a:avLst/>
-              </a:prstGeom>
-              <a:solidFill>
-                <a:schemeClr val="accent1"/>
-              </a:solidFill>
-              <a:ln w="44450" cap="flat" cmpd="sng" algn="ctr">
-                <a:solidFill>
-                  <a:schemeClr val="tx1"/>
-                </a:solidFill>
-                <a:prstDash val="solid"/>
-                <a:round/>
-                <a:headEnd type="none" w="sm" len="sm"/>
-                <a:tailEnd type="none" w="sm" len="sm"/>
-              </a:ln>
-              <a:effectLst/>
-            </p:spPr>
-          </p:cxnSp>
-          <p:cxnSp>
-            <p:nvCxnSpPr>
-              <p:cNvPr id="429083" name="Straight Connector 429082">
-                <a:extLst>
-                  <a:ext uri="{FF2B5EF4-FFF2-40B4-BE49-F238E27FC236}">
-                    <a16:creationId xmlns:a16="http://schemas.microsoft.com/office/drawing/2014/main" id="{AEFA7CE8-E656-211A-6383-B4112CAA46C8}"/>
-                  </a:ext>
-                </a:extLst>
-              </p:cNvPr>
-              <p:cNvCxnSpPr>
-                <a:cxnSpLocks/>
-                <a:stCxn id="429080" idx="2"/>
-              </p:cNvCxnSpPr>
-              <p:nvPr/>
-            </p:nvCxnSpPr>
-            <p:spPr bwMode="auto">
-              <a:xfrm flipH="1">
-                <a:off x="8285969" y="2749562"/>
-                <a:ext cx="508567" cy="0"/>
-              </a:xfrm>
-              <a:prstGeom prst="line">
-                <a:avLst/>
-              </a:prstGeom>
-              <a:solidFill>
-                <a:schemeClr val="accent1"/>
-              </a:solidFill>
-              <a:ln w="12700" cap="flat" cmpd="sng" algn="ctr">
-                <a:solidFill>
-                  <a:schemeClr val="tx1"/>
-                </a:solidFill>
-                <a:prstDash val="solid"/>
-                <a:round/>
-                <a:headEnd type="none" w="sm" len="sm"/>
-                <a:tailEnd type="none" w="sm" len="sm"/>
-              </a:ln>
-              <a:effectLst/>
-            </p:spPr>
-          </p:cxnSp>
-          <p:cxnSp>
-            <p:nvCxnSpPr>
-              <p:cNvPr id="429084" name="Straight Connector 429083">
-                <a:extLst>
-                  <a:ext uri="{FF2B5EF4-FFF2-40B4-BE49-F238E27FC236}">
-                    <a16:creationId xmlns:a16="http://schemas.microsoft.com/office/drawing/2014/main" id="{9F99734F-F433-D427-17D6-DCB18647C474}"/>
-                  </a:ext>
-                </a:extLst>
-              </p:cNvPr>
-              <p:cNvCxnSpPr>
-                <a:cxnSpLocks/>
-                <a:stCxn id="429078" idx="3"/>
-                <a:endCxn id="429087" idx="7"/>
-              </p:cNvCxnSpPr>
-              <p:nvPr/>
-            </p:nvCxnSpPr>
-            <p:spPr bwMode="auto">
-              <a:xfrm flipH="1">
-                <a:off x="8976967" y="1784153"/>
-                <a:ext cx="602023" cy="217188"/>
-              </a:xfrm>
-              <a:prstGeom prst="line">
-                <a:avLst/>
-              </a:prstGeom>
-              <a:solidFill>
-                <a:schemeClr val="accent1"/>
-              </a:solidFill>
-              <a:ln w="12700" cap="flat" cmpd="sng" algn="ctr">
-                <a:solidFill>
-                  <a:schemeClr val="tx1"/>
-                </a:solidFill>
-                <a:prstDash val="solid"/>
-                <a:round/>
-                <a:headEnd type="none" w="sm" len="sm"/>
-                <a:tailEnd type="none" w="sm" len="sm"/>
-              </a:ln>
-              <a:effectLst/>
-            </p:spPr>
-          </p:cxnSp>
-          <p:cxnSp>
-            <p:nvCxnSpPr>
-              <p:cNvPr id="429085" name="Straight Connector 429084">
-                <a:extLst>
-                  <a:ext uri="{FF2B5EF4-FFF2-40B4-BE49-F238E27FC236}">
-                    <a16:creationId xmlns:a16="http://schemas.microsoft.com/office/drawing/2014/main" id="{FE019E55-A981-5290-ECE7-7D999253EC96}"/>
-                  </a:ext>
-                </a:extLst>
-              </p:cNvPr>
-              <p:cNvCxnSpPr>
-                <a:cxnSpLocks/>
-                <a:stCxn id="429080" idx="0"/>
-                <a:endCxn id="429087" idx="4"/>
-              </p:cNvCxnSpPr>
-              <p:nvPr/>
-            </p:nvCxnSpPr>
-            <p:spPr bwMode="auto">
-              <a:xfrm flipH="1" flipV="1">
-                <a:off x="8900499" y="2185951"/>
-                <a:ext cx="2179" cy="455469"/>
-              </a:xfrm>
-              <a:prstGeom prst="line">
-                <a:avLst/>
-              </a:prstGeom>
-              <a:solidFill>
-                <a:schemeClr val="accent1"/>
-              </a:solidFill>
-              <a:ln w="12700" cap="flat" cmpd="sng" algn="ctr">
-                <a:solidFill>
-                  <a:schemeClr val="tx1"/>
-                </a:solidFill>
-                <a:prstDash val="solid"/>
-                <a:round/>
-                <a:headEnd type="none" w="sm" len="sm"/>
-                <a:tailEnd type="none" w="sm" len="sm"/>
-              </a:ln>
-              <a:effectLst/>
-            </p:spPr>
-          </p:cxnSp>
-          <p:cxnSp>
-            <p:nvCxnSpPr>
-              <p:cNvPr id="429086" name="Straight Connector 429085">
-                <a:extLst>
-                  <a:ext uri="{FF2B5EF4-FFF2-40B4-BE49-F238E27FC236}">
-                    <a16:creationId xmlns:a16="http://schemas.microsoft.com/office/drawing/2014/main" id="{07B40FAE-B7D2-4413-74A6-8999574B835E}"/>
-                  </a:ext>
-                </a:extLst>
-              </p:cNvPr>
-              <p:cNvCxnSpPr>
-                <a:cxnSpLocks/>
-                <a:stCxn id="429078" idx="4"/>
-                <a:endCxn id="429088" idx="0"/>
-              </p:cNvCxnSpPr>
-              <p:nvPr/>
-            </p:nvCxnSpPr>
-            <p:spPr bwMode="auto">
-              <a:xfrm flipH="1">
-                <a:off x="9652263" y="1815827"/>
-                <a:ext cx="3195" cy="825593"/>
-              </a:xfrm>
-              <a:prstGeom prst="line">
-                <a:avLst/>
-              </a:prstGeom>
-              <a:solidFill>
-                <a:schemeClr val="accent1"/>
-              </a:solidFill>
-              <a:ln w="12700" cap="flat" cmpd="sng" algn="ctr">
-                <a:solidFill>
-                  <a:schemeClr val="tx1"/>
-                </a:solidFill>
-                <a:prstDash val="solid"/>
-                <a:round/>
-                <a:headEnd type="none" w="sm" len="sm"/>
-                <a:tailEnd type="none" w="sm" len="sm"/>
-              </a:ln>
-              <a:effectLst/>
-            </p:spPr>
-          </p:cxnSp>
-          <p:sp>
-            <p:nvSpPr>
-              <p:cNvPr id="429087" name="Oval 429086">
-                <a:extLst>
-                  <a:ext uri="{FF2B5EF4-FFF2-40B4-BE49-F238E27FC236}">
-                    <a16:creationId xmlns:a16="http://schemas.microsoft.com/office/drawing/2014/main" id="{2BF66F7E-8695-6ABF-35B0-3409052269A8}"/>
-                  </a:ext>
-                </a:extLst>
-              </p:cNvPr>
-              <p:cNvSpPr/>
-              <p:nvPr/>
-            </p:nvSpPr>
-            <p:spPr bwMode="auto">
-              <a:xfrm>
-                <a:off x="8792357" y="1969667"/>
-                <a:ext cx="216284" cy="216284"/>
-              </a:xfrm>
-              <a:prstGeom prst="ellipse">
-                <a:avLst/>
-              </a:prstGeom>
-              <a:solidFill>
-                <a:srgbClr val="CCFFCC"/>
-              </a:solidFill>
-              <a:ln w="12700" cap="flat" cmpd="sng" algn="ctr">
-                <a:solidFill>
-                  <a:schemeClr val="tx1"/>
-                </a:solidFill>
-                <a:prstDash val="solid"/>
-                <a:round/>
-                <a:headEnd type="none" w="sm" len="sm"/>
-                <a:tailEnd type="none" w="sm" len="sm"/>
-              </a:ln>
-              <a:effectLst/>
-            </p:spPr>
-            <p:txBody>
-              <a:bodyPr vert="horz" wrap="square" lIns="91440" tIns="45720" rIns="91440" bIns="45720" numCol="1" rtlCol="0" anchor="ctr" anchorCtr="0" compatLnSpc="1">
-                <a:prstTxWarp prst="textNoShape">
-                  <a:avLst/>
-                </a:prstTxWarp>
-              </a:bodyPr>
-              <a:lstStyle/>
-              <a:p>
-                <a:pPr marL="0" marR="0" indent="0" algn="ctr" defTabSz="914400" rtl="0" eaLnBrk="0" fontAlgn="base" latinLnBrk="0" hangingPunct="0">
-                  <a:lnSpc>
-                    <a:spcPct val="100000"/>
-                  </a:lnSpc>
-                  <a:spcBef>
-                    <a:spcPct val="0"/>
-                  </a:spcBef>
-                  <a:spcAft>
-                    <a:spcPct val="0"/>
-                  </a:spcAft>
-                  <a:buClrTx/>
-                  <a:buSzTx/>
-                  <a:buFontTx/>
-                  <a:buNone/>
-                  <a:tabLst/>
-                </a:pPr>
-                <a:r>
-                  <a:rPr kumimoji="0" lang="en-US" sz="1200" b="0" i="1" u="none" strike="noStrike" cap="none" normalizeH="0" baseline="0" dirty="0">
-                    <a:ln>
-                      <a:noFill/>
-                    </a:ln>
-                    <a:solidFill>
-                      <a:schemeClr val="tx2"/>
-                    </a:solidFill>
-                    <a:effectLst/>
-                    <a:latin typeface="Verdana" panose="020B0604030504040204" pitchFamily="34" charset="0"/>
-                    <a:ea typeface="Verdana" panose="020B0604030504040204" pitchFamily="34" charset="0"/>
-                    <a:cs typeface="Verdana" panose="020B0604030504040204" pitchFamily="34" charset="0"/>
-                  </a:rPr>
-                  <a:t>e</a:t>
-                </a:r>
-              </a:p>
-            </p:txBody>
-          </p:sp>
-          <p:sp>
-            <p:nvSpPr>
-              <p:cNvPr id="429088" name="Oval 429087">
-                <a:extLst>
-                  <a:ext uri="{FF2B5EF4-FFF2-40B4-BE49-F238E27FC236}">
-                    <a16:creationId xmlns:a16="http://schemas.microsoft.com/office/drawing/2014/main" id="{2A1C5804-0C17-6D19-1FF7-48D76196D2B2}"/>
-                  </a:ext>
-                </a:extLst>
-              </p:cNvPr>
-              <p:cNvSpPr/>
-              <p:nvPr/>
-            </p:nvSpPr>
-            <p:spPr bwMode="auto">
-              <a:xfrm>
-                <a:off x="9544121" y="2641420"/>
-                <a:ext cx="216284" cy="216284"/>
-              </a:xfrm>
-              <a:prstGeom prst="ellipse">
-                <a:avLst/>
-              </a:prstGeom>
-              <a:solidFill>
-                <a:srgbClr val="CCFFCC"/>
-              </a:solidFill>
-              <a:ln w="12700" cap="flat" cmpd="sng" algn="ctr">
-                <a:solidFill>
-                  <a:schemeClr val="tx1"/>
-                </a:solidFill>
-                <a:prstDash val="solid"/>
-                <a:round/>
-                <a:headEnd type="none" w="sm" len="sm"/>
-                <a:tailEnd type="none" w="sm" len="sm"/>
-              </a:ln>
-              <a:effectLst/>
-            </p:spPr>
-            <p:txBody>
-              <a:bodyPr vert="horz" wrap="square" lIns="91440" tIns="45720" rIns="91440" bIns="45720" numCol="1" rtlCol="0" anchor="ctr" anchorCtr="0" compatLnSpc="1">
-                <a:prstTxWarp prst="textNoShape">
-                  <a:avLst/>
-                </a:prstTxWarp>
-              </a:bodyPr>
-              <a:lstStyle/>
-              <a:p>
-                <a:pPr marL="0" marR="0" indent="0" algn="ctr" defTabSz="914400" rtl="0" eaLnBrk="0" fontAlgn="base" latinLnBrk="0" hangingPunct="0">
-                  <a:lnSpc>
-                    <a:spcPct val="100000"/>
-                  </a:lnSpc>
-                  <a:spcBef>
-                    <a:spcPct val="0"/>
-                  </a:spcBef>
-                  <a:spcAft>
-                    <a:spcPct val="0"/>
-                  </a:spcAft>
-                  <a:buClrTx/>
-                  <a:buSzTx/>
-                  <a:buFontTx/>
-                  <a:buNone/>
-                  <a:tabLst/>
-                </a:pPr>
-                <a:r>
-                  <a:rPr kumimoji="0" lang="en-US" sz="1200" b="0" i="1" u="none" strike="noStrike" cap="none" normalizeH="0" baseline="0" dirty="0">
-                    <a:ln>
-                      <a:noFill/>
-                    </a:ln>
-                    <a:solidFill>
-                      <a:schemeClr val="tx2"/>
-                    </a:solidFill>
-                    <a:effectLst/>
-                    <a:latin typeface="Verdana" panose="020B0604030504040204" pitchFamily="34" charset="0"/>
-                    <a:ea typeface="Verdana" panose="020B0604030504040204" pitchFamily="34" charset="0"/>
-                    <a:cs typeface="Verdana" panose="020B0604030504040204" pitchFamily="34" charset="0"/>
-                  </a:rPr>
-                  <a:t>h</a:t>
-                </a:r>
-              </a:p>
-            </p:txBody>
-          </p:sp>
-          <p:cxnSp>
-            <p:nvCxnSpPr>
-              <p:cNvPr id="429089" name="Straight Connector 429088">
-                <a:extLst>
-                  <a:ext uri="{FF2B5EF4-FFF2-40B4-BE49-F238E27FC236}">
-                    <a16:creationId xmlns:a16="http://schemas.microsoft.com/office/drawing/2014/main" id="{285B6BF8-5488-1046-9410-D3E8B2F664CA}"/>
-                  </a:ext>
-                </a:extLst>
-              </p:cNvPr>
-              <p:cNvCxnSpPr>
-                <a:cxnSpLocks/>
-                <a:stCxn id="429069" idx="6"/>
-                <a:endCxn id="429078" idx="2"/>
-              </p:cNvCxnSpPr>
-              <p:nvPr/>
-            </p:nvCxnSpPr>
-            <p:spPr bwMode="auto">
-              <a:xfrm>
-                <a:off x="7606046" y="1698820"/>
-                <a:ext cx="1941270" cy="8865"/>
-              </a:xfrm>
-              <a:prstGeom prst="line">
-                <a:avLst/>
-              </a:prstGeom>
-              <a:solidFill>
-                <a:schemeClr val="accent1"/>
-              </a:solidFill>
-              <a:ln w="44450" cap="flat" cmpd="sng" algn="ctr">
-                <a:solidFill>
-                  <a:schemeClr val="tx1"/>
-                </a:solidFill>
-                <a:prstDash val="solid"/>
-                <a:round/>
-                <a:headEnd type="none" w="sm" len="sm"/>
-                <a:tailEnd type="none" w="sm" len="sm"/>
-              </a:ln>
-              <a:effectLst/>
-            </p:spPr>
-          </p:cxnSp>
-        </p:grpSp>
-        <p:grpSp>
-          <p:nvGrpSpPr>
-            <p:cNvPr id="429095" name="Group 429094">
-              <a:extLst>
-                <a:ext uri="{FF2B5EF4-FFF2-40B4-BE49-F238E27FC236}">
-                  <a16:creationId xmlns:a16="http://schemas.microsoft.com/office/drawing/2014/main" id="{9879747D-5B56-1D58-55BF-A45B57E15992}"/>
-                </a:ext>
-              </a:extLst>
-            </p:cNvPr>
-            <p:cNvGrpSpPr/>
-            <p:nvPr/>
-          </p:nvGrpSpPr>
-          <p:grpSpPr>
-            <a:xfrm>
-              <a:off x="3112864" y="1600554"/>
-              <a:ext cx="3645653" cy="1247275"/>
-              <a:chOff x="3112864" y="1610429"/>
-              <a:chExt cx="3645653" cy="1247275"/>
-            </a:xfrm>
-          </p:grpSpPr>
-          <p:sp>
-            <p:nvSpPr>
-              <p:cNvPr id="22" name="Oval 21">
-                <a:extLst>
-                  <a:ext uri="{FF2B5EF4-FFF2-40B4-BE49-F238E27FC236}">
-                    <a16:creationId xmlns:a16="http://schemas.microsoft.com/office/drawing/2014/main" id="{BE281706-2119-7E77-C19B-F2ABE6850402}"/>
-                  </a:ext>
-                </a:extLst>
-              </p:cNvPr>
-              <p:cNvSpPr/>
-              <p:nvPr/>
-            </p:nvSpPr>
-            <p:spPr bwMode="auto">
-              <a:xfrm>
-                <a:off x="3809034" y="1969667"/>
-                <a:ext cx="216284" cy="216284"/>
-              </a:xfrm>
-              <a:prstGeom prst="ellipse">
-                <a:avLst/>
-              </a:prstGeom>
-              <a:solidFill>
-                <a:srgbClr val="CCFFFF"/>
-              </a:solidFill>
-              <a:ln w="12700" cap="flat" cmpd="sng" algn="ctr">
-                <a:solidFill>
-                  <a:schemeClr val="tx1"/>
-                </a:solidFill>
-                <a:prstDash val="solid"/>
-                <a:round/>
-                <a:headEnd type="none" w="sm" len="sm"/>
-                <a:tailEnd type="none" w="sm" len="sm"/>
-              </a:ln>
-              <a:effectLst/>
-            </p:spPr>
-            <p:txBody>
-              <a:bodyPr vert="horz" wrap="square" lIns="91440" tIns="45720" rIns="91440" bIns="45720" numCol="1" rtlCol="0" anchor="ctr" anchorCtr="0" compatLnSpc="1">
-                <a:prstTxWarp prst="textNoShape">
-                  <a:avLst/>
-                </a:prstTxWarp>
-              </a:bodyPr>
-              <a:lstStyle/>
-              <a:p>
-                <a:pPr marL="0" marR="0" indent="0" algn="ctr" defTabSz="914400" rtl="0" eaLnBrk="0" fontAlgn="base" latinLnBrk="0" hangingPunct="0">
-                  <a:lnSpc>
-                    <a:spcPct val="100000"/>
-                  </a:lnSpc>
-                  <a:spcBef>
-                    <a:spcPct val="0"/>
-                  </a:spcBef>
-                  <a:spcAft>
-                    <a:spcPct val="0"/>
-                  </a:spcAft>
-                  <a:buClrTx/>
-                  <a:buSzTx/>
-                  <a:buFontTx/>
-                  <a:buNone/>
-                  <a:tabLst/>
-                </a:pPr>
-                <a:r>
-                  <a:rPr kumimoji="0" lang="en-US" sz="1200" b="0" i="1" u="none" strike="noStrike" cap="none" normalizeH="0" baseline="0" dirty="0">
-                    <a:ln>
-                      <a:noFill/>
-                    </a:ln>
-                    <a:solidFill>
-                      <a:schemeClr val="tx2"/>
-                    </a:solidFill>
-                    <a:effectLst/>
-                    <a:latin typeface="Verdana" panose="020B0604030504040204" pitchFamily="34" charset="0"/>
-                    <a:ea typeface="Verdana" panose="020B0604030504040204" pitchFamily="34" charset="0"/>
-                    <a:cs typeface="Verdana" panose="020B0604030504040204" pitchFamily="34" charset="0"/>
-                  </a:rPr>
-                  <a:t>b</a:t>
-                </a:r>
-              </a:p>
-            </p:txBody>
-          </p:sp>
-          <p:sp>
-            <p:nvSpPr>
-              <p:cNvPr id="23" name="Oval 22">
-                <a:extLst>
-                  <a:ext uri="{FF2B5EF4-FFF2-40B4-BE49-F238E27FC236}">
-                    <a16:creationId xmlns:a16="http://schemas.microsoft.com/office/drawing/2014/main" id="{600B7522-066A-767F-C9A3-5EC5089822BD}"/>
-                  </a:ext>
-                </a:extLst>
-              </p:cNvPr>
-              <p:cNvSpPr/>
-              <p:nvPr/>
-            </p:nvSpPr>
-            <p:spPr bwMode="auto">
-              <a:xfrm>
-                <a:off x="3112864" y="2641420"/>
-                <a:ext cx="216284" cy="216284"/>
-              </a:xfrm>
-              <a:prstGeom prst="ellipse">
-                <a:avLst/>
-              </a:prstGeom>
-              <a:solidFill>
-                <a:srgbClr val="CCFFFF"/>
-              </a:solidFill>
-              <a:ln w="12700" cap="flat" cmpd="sng" algn="ctr">
-                <a:solidFill>
-                  <a:schemeClr val="tx1"/>
-                </a:solidFill>
-                <a:prstDash val="solid"/>
-                <a:round/>
-                <a:headEnd type="none" w="sm" len="sm"/>
-                <a:tailEnd type="none" w="sm" len="sm"/>
-              </a:ln>
-              <a:effectLst/>
-            </p:spPr>
-            <p:txBody>
-              <a:bodyPr vert="horz" wrap="square" lIns="91440" tIns="45720" rIns="91440" bIns="45720" numCol="1" rtlCol="0" anchor="ctr" anchorCtr="0" compatLnSpc="1">
-                <a:prstTxWarp prst="textNoShape">
-                  <a:avLst/>
-                </a:prstTxWarp>
-              </a:bodyPr>
-              <a:lstStyle/>
-              <a:p>
-                <a:pPr marL="0" marR="0" indent="0" algn="ctr" defTabSz="914400" rtl="0" eaLnBrk="0" fontAlgn="base" latinLnBrk="0" hangingPunct="0">
-                  <a:lnSpc>
-                    <a:spcPct val="100000"/>
-                  </a:lnSpc>
-                  <a:spcBef>
-                    <a:spcPct val="0"/>
-                  </a:spcBef>
-                  <a:spcAft>
-                    <a:spcPct val="0"/>
-                  </a:spcAft>
-                  <a:buClrTx/>
-                  <a:buSzTx/>
-                  <a:buFontTx/>
-                  <a:buNone/>
-                  <a:tabLst/>
-                </a:pPr>
-                <a:r>
-                  <a:rPr kumimoji="0" lang="en-US" sz="1200" b="0" i="1" u="none" strike="noStrike" cap="none" normalizeH="0" baseline="0" dirty="0">
-                    <a:ln>
-                      <a:noFill/>
-                    </a:ln>
-                    <a:solidFill>
-                      <a:schemeClr val="tx2"/>
-                    </a:solidFill>
-                    <a:effectLst/>
-                    <a:latin typeface="Verdana" panose="020B0604030504040204" pitchFamily="34" charset="0"/>
-                    <a:ea typeface="Verdana" panose="020B0604030504040204" pitchFamily="34" charset="0"/>
-                    <a:cs typeface="Verdana" panose="020B0604030504040204" pitchFamily="34" charset="0"/>
-                  </a:rPr>
-                  <a:t>c</a:t>
-                </a:r>
-              </a:p>
-            </p:txBody>
-          </p:sp>
-          <p:sp>
-            <p:nvSpPr>
-              <p:cNvPr id="24" name="Oval 23">
-                <a:extLst>
-                  <a:ext uri="{FF2B5EF4-FFF2-40B4-BE49-F238E27FC236}">
-                    <a16:creationId xmlns:a16="http://schemas.microsoft.com/office/drawing/2014/main" id="{0004C934-1945-C521-B3A2-7A76F9BC4D4E}"/>
-                  </a:ext>
-                </a:extLst>
-              </p:cNvPr>
-              <p:cNvSpPr/>
-              <p:nvPr/>
-            </p:nvSpPr>
-            <p:spPr bwMode="auto">
-              <a:xfrm>
-                <a:off x="4538542" y="1610429"/>
-                <a:ext cx="216284" cy="216284"/>
-              </a:xfrm>
-              <a:prstGeom prst="ellipse">
-                <a:avLst/>
-              </a:prstGeom>
-              <a:solidFill>
-                <a:srgbClr val="CCFFFF"/>
-              </a:solidFill>
-              <a:ln w="12700" cap="flat" cmpd="sng" algn="ctr">
-                <a:solidFill>
-                  <a:schemeClr val="tx1"/>
-                </a:solidFill>
-                <a:prstDash val="solid"/>
-                <a:round/>
-                <a:headEnd type="none" w="sm" len="sm"/>
-                <a:tailEnd type="none" w="sm" len="sm"/>
-              </a:ln>
-              <a:effectLst/>
-            </p:spPr>
-            <p:txBody>
-              <a:bodyPr vert="horz" wrap="square" lIns="91440" tIns="45720" rIns="91440" bIns="45720" numCol="1" rtlCol="0" anchor="ctr" anchorCtr="0" compatLnSpc="1">
-                <a:prstTxWarp prst="textNoShape">
-                  <a:avLst/>
-                </a:prstTxWarp>
-              </a:bodyPr>
-              <a:lstStyle/>
-              <a:p>
-                <a:pPr marL="0" marR="0" indent="0" algn="ctr" defTabSz="914400" rtl="0" eaLnBrk="0" fontAlgn="base" latinLnBrk="0" hangingPunct="0">
-                  <a:lnSpc>
-                    <a:spcPct val="100000"/>
-                  </a:lnSpc>
-                  <a:spcBef>
-                    <a:spcPct val="0"/>
-                  </a:spcBef>
-                  <a:spcAft>
-                    <a:spcPct val="0"/>
-                  </a:spcAft>
-                  <a:buClrTx/>
-                  <a:buSzTx/>
-                  <a:buFontTx/>
-                  <a:buNone/>
-                  <a:tabLst/>
-                </a:pPr>
-                <a:r>
-                  <a:rPr kumimoji="0" lang="en-US" sz="1200" b="0" i="1" u="none" strike="noStrike" cap="none" normalizeH="0" baseline="0" dirty="0">
-                    <a:ln>
-                      <a:noFill/>
-                    </a:ln>
-                    <a:solidFill>
-                      <a:schemeClr val="tx2"/>
-                    </a:solidFill>
-                    <a:effectLst/>
-                    <a:latin typeface="Verdana" panose="020B0604030504040204" pitchFamily="34" charset="0"/>
-                    <a:ea typeface="Verdana" panose="020B0604030504040204" pitchFamily="34" charset="0"/>
-                    <a:cs typeface="Verdana" panose="020B0604030504040204" pitchFamily="34" charset="0"/>
-                  </a:rPr>
-                  <a:t>f</a:t>
-                </a:r>
-              </a:p>
-            </p:txBody>
-          </p:sp>
-          <p:sp>
-            <p:nvSpPr>
-              <p:cNvPr id="25" name="Oval 24">
-                <a:extLst>
-                  <a:ext uri="{FF2B5EF4-FFF2-40B4-BE49-F238E27FC236}">
-                    <a16:creationId xmlns:a16="http://schemas.microsoft.com/office/drawing/2014/main" id="{34A5B0D9-16D6-3277-8CA1-AA1430058A4B}"/>
-                  </a:ext>
-                </a:extLst>
-              </p:cNvPr>
-              <p:cNvSpPr/>
-              <p:nvPr/>
-            </p:nvSpPr>
-            <p:spPr bwMode="auto">
-              <a:xfrm>
-                <a:off x="3114170" y="1610429"/>
-                <a:ext cx="216284" cy="216284"/>
-              </a:xfrm>
-              <a:prstGeom prst="ellipse">
-                <a:avLst/>
-              </a:prstGeom>
-              <a:solidFill>
-                <a:srgbClr val="CCFFCC"/>
-              </a:solidFill>
-              <a:ln w="12700" cap="flat" cmpd="sng" algn="ctr">
-                <a:solidFill>
-                  <a:schemeClr val="tx1"/>
-                </a:solidFill>
-                <a:prstDash val="solid"/>
-                <a:round/>
-                <a:headEnd type="none" w="sm" len="sm"/>
-                <a:tailEnd type="none" w="sm" len="sm"/>
-              </a:ln>
-              <a:effectLst/>
-            </p:spPr>
-            <p:txBody>
-              <a:bodyPr vert="horz" wrap="square" lIns="91440" tIns="45720" rIns="91440" bIns="45720" numCol="1" rtlCol="0" anchor="ctr" anchorCtr="0" compatLnSpc="1">
-                <a:prstTxWarp prst="textNoShape">
-                  <a:avLst/>
-                </a:prstTxWarp>
-              </a:bodyPr>
-              <a:lstStyle/>
-              <a:p>
-                <a:pPr marL="0" marR="0" indent="0" algn="ctr" defTabSz="914400" rtl="0" eaLnBrk="0" fontAlgn="base" latinLnBrk="0" hangingPunct="0">
-                  <a:lnSpc>
-                    <a:spcPct val="100000"/>
-                  </a:lnSpc>
-                  <a:spcBef>
-                    <a:spcPct val="0"/>
-                  </a:spcBef>
-                  <a:spcAft>
-                    <a:spcPct val="0"/>
-                  </a:spcAft>
-                  <a:buClrTx/>
-                  <a:buSzTx/>
-                  <a:buFontTx/>
-                  <a:buNone/>
-                  <a:tabLst/>
-                </a:pPr>
-                <a:r>
-                  <a:rPr kumimoji="0" lang="en-US" sz="1200" b="0" i="1" u="none" strike="noStrike" cap="none" normalizeH="0" baseline="0" dirty="0">
-                    <a:ln>
-                      <a:noFill/>
-                    </a:ln>
-                    <a:solidFill>
-                      <a:schemeClr val="tx2"/>
-                    </a:solidFill>
-                    <a:effectLst/>
-                    <a:latin typeface="Verdana" panose="020B0604030504040204" pitchFamily="34" charset="0"/>
-                    <a:ea typeface="Verdana" panose="020B0604030504040204" pitchFamily="34" charset="0"/>
-                    <a:cs typeface="Verdana" panose="020B0604030504040204" pitchFamily="34" charset="0"/>
-                  </a:rPr>
-                  <a:t>a</a:t>
-                </a:r>
-              </a:p>
-            </p:txBody>
-          </p:sp>
-          <p:sp>
-            <p:nvSpPr>
-              <p:cNvPr id="26" name="Oval 25">
-                <a:extLst>
-                  <a:ext uri="{FF2B5EF4-FFF2-40B4-BE49-F238E27FC236}">
-                    <a16:creationId xmlns:a16="http://schemas.microsoft.com/office/drawing/2014/main" id="{1755183D-1DFE-DEF3-7055-222E3BFBFD6B}"/>
-                  </a:ext>
-                </a:extLst>
-              </p:cNvPr>
-              <p:cNvSpPr/>
-              <p:nvPr/>
-            </p:nvSpPr>
-            <p:spPr bwMode="auto">
-              <a:xfrm>
-                <a:off x="4536878" y="2641420"/>
-                <a:ext cx="216284" cy="216284"/>
-              </a:xfrm>
-              <a:prstGeom prst="ellipse">
-                <a:avLst/>
-              </a:prstGeom>
-              <a:solidFill>
-                <a:srgbClr val="CCFFFF"/>
-              </a:solidFill>
-              <a:ln w="12700" cap="flat" cmpd="sng" algn="ctr">
-                <a:solidFill>
-                  <a:schemeClr val="tx1"/>
-                </a:solidFill>
-                <a:prstDash val="solid"/>
-                <a:round/>
-                <a:headEnd type="none" w="sm" len="sm"/>
-                <a:tailEnd type="none" w="sm" len="sm"/>
-              </a:ln>
-              <a:effectLst/>
-            </p:spPr>
-            <p:txBody>
-              <a:bodyPr vert="horz" wrap="square" lIns="91440" tIns="45720" rIns="91440" bIns="45720" numCol="1" rtlCol="0" anchor="ctr" anchorCtr="0" compatLnSpc="1">
-                <a:prstTxWarp prst="textNoShape">
-                  <a:avLst/>
-                </a:prstTxWarp>
-              </a:bodyPr>
-              <a:lstStyle/>
-              <a:p>
-                <a:pPr marL="0" marR="0" indent="0" algn="ctr" defTabSz="914400" rtl="0" eaLnBrk="0" fontAlgn="base" latinLnBrk="0" hangingPunct="0">
-                  <a:lnSpc>
-                    <a:spcPct val="100000"/>
-                  </a:lnSpc>
-                  <a:spcBef>
-                    <a:spcPct val="0"/>
-                  </a:spcBef>
-                  <a:spcAft>
-                    <a:spcPct val="0"/>
-                  </a:spcAft>
-                  <a:buClrTx/>
-                  <a:buSzTx/>
-                  <a:buFontTx/>
-                  <a:buNone/>
-                  <a:tabLst/>
-                </a:pPr>
-                <a:r>
-                  <a:rPr kumimoji="0" lang="en-US" sz="1200" b="0" i="1" u="none" strike="noStrike" cap="none" normalizeH="0" baseline="0" dirty="0">
-                    <a:ln>
-                      <a:noFill/>
-                    </a:ln>
-                    <a:solidFill>
-                      <a:schemeClr val="tx2"/>
-                    </a:solidFill>
-                    <a:effectLst/>
-                    <a:latin typeface="Verdana" panose="020B0604030504040204" pitchFamily="34" charset="0"/>
-                    <a:ea typeface="Verdana" panose="020B0604030504040204" pitchFamily="34" charset="0"/>
-                    <a:cs typeface="Verdana" panose="020B0604030504040204" pitchFamily="34" charset="0"/>
-                  </a:rPr>
-                  <a:t>g</a:t>
-                </a:r>
-              </a:p>
-            </p:txBody>
-          </p:sp>
-          <p:sp>
-            <p:nvSpPr>
-              <p:cNvPr id="27" name="Oval 26">
-                <a:extLst>
-                  <a:ext uri="{FF2B5EF4-FFF2-40B4-BE49-F238E27FC236}">
-                    <a16:creationId xmlns:a16="http://schemas.microsoft.com/office/drawing/2014/main" id="{5F46866F-0C4B-27B6-1758-315D546E7B42}"/>
-                  </a:ext>
-                </a:extLst>
-              </p:cNvPr>
-              <p:cNvSpPr/>
-              <p:nvPr/>
-            </p:nvSpPr>
-            <p:spPr bwMode="auto">
-              <a:xfrm>
-                <a:off x="3812027" y="2641420"/>
-                <a:ext cx="216284" cy="216284"/>
-              </a:xfrm>
-              <a:prstGeom prst="ellipse">
-                <a:avLst/>
-              </a:prstGeom>
-              <a:solidFill>
-                <a:srgbClr val="CCFFCC"/>
-              </a:solidFill>
-              <a:ln w="12700" cap="flat" cmpd="sng" algn="ctr">
-                <a:solidFill>
-                  <a:schemeClr val="tx1"/>
-                </a:solidFill>
-                <a:prstDash val="solid"/>
-                <a:round/>
-                <a:headEnd type="none" w="sm" len="sm"/>
-                <a:tailEnd type="none" w="sm" len="sm"/>
-              </a:ln>
-              <a:effectLst/>
-            </p:spPr>
-            <p:txBody>
-              <a:bodyPr vert="horz" wrap="square" lIns="91440" tIns="45720" rIns="91440" bIns="45720" numCol="1" rtlCol="0" anchor="ctr" anchorCtr="0" compatLnSpc="1">
-                <a:prstTxWarp prst="textNoShape">
-                  <a:avLst/>
-                </a:prstTxWarp>
-              </a:bodyPr>
-              <a:lstStyle/>
-              <a:p>
-                <a:pPr marL="0" marR="0" indent="0" algn="ctr" defTabSz="914400" rtl="0" eaLnBrk="0" fontAlgn="base" latinLnBrk="0" hangingPunct="0">
-                  <a:lnSpc>
-                    <a:spcPct val="100000"/>
-                  </a:lnSpc>
-                  <a:spcBef>
-                    <a:spcPct val="0"/>
-                  </a:spcBef>
-                  <a:spcAft>
-                    <a:spcPct val="0"/>
-                  </a:spcAft>
-                  <a:buClrTx/>
-                  <a:buSzTx/>
-                  <a:buFontTx/>
-                  <a:buNone/>
-                  <a:tabLst/>
-                </a:pPr>
-                <a:r>
-                  <a:rPr lang="en-US" sz="1200" i="1" dirty="0">
-                    <a:latin typeface="Verdana" panose="020B0604030504040204" pitchFamily="34" charset="0"/>
-                    <a:ea typeface="Verdana" panose="020B0604030504040204" pitchFamily="34" charset="0"/>
-                    <a:cs typeface="Verdana" panose="020B0604030504040204" pitchFamily="34" charset="0"/>
-                  </a:rPr>
-                  <a:t>d</a:t>
-                </a:r>
-                <a:endParaRPr kumimoji="0" lang="en-US" sz="1200" b="0" i="1" u="none" strike="noStrike" cap="none" normalizeH="0" baseline="0" dirty="0">
-                  <a:ln>
-                    <a:noFill/>
-                  </a:ln>
-                  <a:solidFill>
-                    <a:schemeClr val="tx2"/>
-                  </a:solidFill>
-                  <a:effectLst/>
-                  <a:latin typeface="Verdana" panose="020B0604030504040204" pitchFamily="34" charset="0"/>
-                  <a:ea typeface="Verdana" panose="020B0604030504040204" pitchFamily="34" charset="0"/>
-                  <a:cs typeface="Verdana" panose="020B0604030504040204" pitchFamily="34" charset="0"/>
-                </a:endParaRPr>
-              </a:p>
-            </p:txBody>
-          </p:sp>
-          <p:cxnSp>
-            <p:nvCxnSpPr>
-              <p:cNvPr id="29" name="Straight Connector 28">
-                <a:extLst>
-                  <a:ext uri="{FF2B5EF4-FFF2-40B4-BE49-F238E27FC236}">
-                    <a16:creationId xmlns:a16="http://schemas.microsoft.com/office/drawing/2014/main" id="{E0B29ABA-6F18-44E9-312D-2A89B78FE3EC}"/>
-                  </a:ext>
-                </a:extLst>
-              </p:cNvPr>
-              <p:cNvCxnSpPr>
-                <a:cxnSpLocks/>
-                <a:stCxn id="26" idx="2"/>
-                <a:endCxn id="27" idx="6"/>
-              </p:cNvCxnSpPr>
-              <p:nvPr/>
-            </p:nvCxnSpPr>
-            <p:spPr bwMode="auto">
-              <a:xfrm flipH="1">
-                <a:off x="4028311" y="2749562"/>
-                <a:ext cx="508567" cy="0"/>
-              </a:xfrm>
-              <a:prstGeom prst="line">
-                <a:avLst/>
-              </a:prstGeom>
-              <a:solidFill>
-                <a:schemeClr val="accent1"/>
-              </a:solidFill>
-              <a:ln w="12700" cap="flat" cmpd="sng" algn="ctr">
-                <a:solidFill>
-                  <a:schemeClr val="tx1"/>
-                </a:solidFill>
-                <a:prstDash val="solid"/>
-                <a:round/>
-                <a:headEnd type="none" w="sm" len="sm"/>
-                <a:tailEnd type="none" w="sm" len="sm"/>
-              </a:ln>
-              <a:effectLst/>
-            </p:spPr>
-          </p:cxnSp>
-          <p:cxnSp>
-            <p:nvCxnSpPr>
-              <p:cNvPr id="33" name="Straight Connector 32">
-                <a:extLst>
-                  <a:ext uri="{FF2B5EF4-FFF2-40B4-BE49-F238E27FC236}">
-                    <a16:creationId xmlns:a16="http://schemas.microsoft.com/office/drawing/2014/main" id="{2B8AB97F-6C4F-36D6-A8AC-A3F00E6F72F0}"/>
-                  </a:ext>
-                </a:extLst>
-              </p:cNvPr>
-              <p:cNvCxnSpPr>
-                <a:cxnSpLocks/>
-                <a:stCxn id="25" idx="5"/>
-                <a:endCxn id="22" idx="1"/>
-              </p:cNvCxnSpPr>
-              <p:nvPr/>
-            </p:nvCxnSpPr>
-            <p:spPr bwMode="auto">
-              <a:xfrm>
-                <a:off x="3298780" y="1795039"/>
-                <a:ext cx="541928" cy="206302"/>
-              </a:xfrm>
-              <a:prstGeom prst="line">
-                <a:avLst/>
-              </a:prstGeom>
-              <a:solidFill>
-                <a:schemeClr val="accent1"/>
-              </a:solidFill>
-              <a:ln w="44450" cap="flat" cmpd="sng" algn="ctr">
-                <a:solidFill>
-                  <a:srgbClr val="00B050"/>
-                </a:solidFill>
-                <a:prstDash val="solid"/>
-                <a:round/>
-                <a:headEnd type="none" w="sm" len="sm"/>
-                <a:tailEnd type="none" w="sm" len="sm"/>
-              </a:ln>
-              <a:effectLst/>
-            </p:spPr>
-          </p:cxnSp>
-          <p:cxnSp>
-            <p:nvCxnSpPr>
-              <p:cNvPr id="34" name="Straight Connector 33">
-                <a:extLst>
-                  <a:ext uri="{FF2B5EF4-FFF2-40B4-BE49-F238E27FC236}">
-                    <a16:creationId xmlns:a16="http://schemas.microsoft.com/office/drawing/2014/main" id="{61C175CE-4129-0AFC-7CFB-42109CD474EF}"/>
-                  </a:ext>
-                </a:extLst>
-              </p:cNvPr>
-              <p:cNvCxnSpPr>
-                <a:cxnSpLocks/>
-                <a:stCxn id="27" idx="2"/>
-                <a:endCxn id="23" idx="6"/>
-              </p:cNvCxnSpPr>
-              <p:nvPr/>
-            </p:nvCxnSpPr>
-            <p:spPr bwMode="auto">
-              <a:xfrm flipH="1">
-                <a:off x="3329148" y="2749562"/>
-                <a:ext cx="482879" cy="0"/>
-              </a:xfrm>
-              <a:prstGeom prst="line">
-                <a:avLst/>
-              </a:prstGeom>
-              <a:solidFill>
-                <a:schemeClr val="accent1"/>
-              </a:solidFill>
-              <a:ln w="44450" cap="flat" cmpd="sng" algn="ctr">
-                <a:solidFill>
-                  <a:srgbClr val="00B050"/>
-                </a:solidFill>
-                <a:prstDash val="solid"/>
-                <a:round/>
-                <a:headEnd type="none" w="sm" len="sm"/>
-                <a:tailEnd type="none" w="sm" len="sm"/>
-              </a:ln>
-              <a:effectLst/>
-            </p:spPr>
-          </p:cxnSp>
-          <p:cxnSp>
-            <p:nvCxnSpPr>
-              <p:cNvPr id="35" name="Straight Connector 34">
-                <a:extLst>
-                  <a:ext uri="{FF2B5EF4-FFF2-40B4-BE49-F238E27FC236}">
-                    <a16:creationId xmlns:a16="http://schemas.microsoft.com/office/drawing/2014/main" id="{2C7850CB-4C6F-26BA-2101-9074432BFB31}"/>
-                  </a:ext>
-                </a:extLst>
-              </p:cNvPr>
-              <p:cNvCxnSpPr>
-                <a:cxnSpLocks/>
-                <a:stCxn id="23" idx="0"/>
-                <a:endCxn id="25" idx="4"/>
-              </p:cNvCxnSpPr>
-              <p:nvPr/>
-            </p:nvCxnSpPr>
-            <p:spPr bwMode="auto">
-              <a:xfrm flipV="1">
-                <a:off x="3221006" y="1826713"/>
-                <a:ext cx="1306" cy="814707"/>
-              </a:xfrm>
-              <a:prstGeom prst="line">
-                <a:avLst/>
-              </a:prstGeom>
-              <a:solidFill>
-                <a:schemeClr val="accent1"/>
-              </a:solidFill>
-              <a:ln w="12700" cap="flat" cmpd="sng" algn="ctr">
-                <a:solidFill>
-                  <a:schemeClr val="tx1"/>
-                </a:solidFill>
-                <a:prstDash val="solid"/>
-                <a:round/>
-                <a:headEnd type="none" w="sm" len="sm"/>
-                <a:tailEnd type="none" w="sm" len="sm"/>
-              </a:ln>
-              <a:effectLst/>
-            </p:spPr>
-          </p:cxnSp>
-          <p:cxnSp>
-            <p:nvCxnSpPr>
-              <p:cNvPr id="51" name="Straight Connector 50">
-                <a:extLst>
-                  <a:ext uri="{FF2B5EF4-FFF2-40B4-BE49-F238E27FC236}">
-                    <a16:creationId xmlns:a16="http://schemas.microsoft.com/office/drawing/2014/main" id="{0ED7C475-8FD8-63FA-6C63-5A5C7B5731D0}"/>
-                  </a:ext>
-                </a:extLst>
-              </p:cNvPr>
-              <p:cNvCxnSpPr>
-                <a:cxnSpLocks/>
-                <a:stCxn id="22" idx="4"/>
-                <a:endCxn id="27" idx="0"/>
-              </p:cNvCxnSpPr>
-              <p:nvPr/>
-            </p:nvCxnSpPr>
-            <p:spPr bwMode="auto">
-              <a:xfrm>
-                <a:off x="3917176" y="2185951"/>
-                <a:ext cx="2993" cy="455469"/>
-              </a:xfrm>
-              <a:prstGeom prst="line">
-                <a:avLst/>
-              </a:prstGeom>
-              <a:solidFill>
-                <a:schemeClr val="accent1"/>
-              </a:solidFill>
-              <a:ln w="12700" cap="flat" cmpd="sng" algn="ctr">
-                <a:solidFill>
-                  <a:schemeClr val="tx1"/>
-                </a:solidFill>
-                <a:prstDash val="solid"/>
-                <a:round/>
-                <a:headEnd type="none" w="sm" len="sm"/>
-                <a:tailEnd type="none" w="sm" len="sm"/>
-              </a:ln>
-              <a:effectLst/>
-            </p:spPr>
-          </p:cxnSp>
-          <p:cxnSp>
-            <p:nvCxnSpPr>
-              <p:cNvPr id="54" name="Straight Connector 53">
-                <a:extLst>
-                  <a:ext uri="{FF2B5EF4-FFF2-40B4-BE49-F238E27FC236}">
-                    <a16:creationId xmlns:a16="http://schemas.microsoft.com/office/drawing/2014/main" id="{768720EE-B43B-0BFC-A1A1-B719E988624F}"/>
-                  </a:ext>
-                </a:extLst>
-              </p:cNvPr>
-              <p:cNvCxnSpPr>
-                <a:cxnSpLocks/>
-                <a:stCxn id="25" idx="6"/>
-                <a:endCxn id="24" idx="2"/>
-              </p:cNvCxnSpPr>
-              <p:nvPr/>
-            </p:nvCxnSpPr>
-            <p:spPr bwMode="auto">
-              <a:xfrm>
-                <a:off x="3330454" y="1718571"/>
-                <a:ext cx="1208088" cy="0"/>
-              </a:xfrm>
-              <a:prstGeom prst="line">
-                <a:avLst/>
-              </a:prstGeom>
-              <a:solidFill>
-                <a:schemeClr val="accent1"/>
-              </a:solidFill>
-              <a:ln w="12700" cap="flat" cmpd="sng" algn="ctr">
-                <a:solidFill>
-                  <a:schemeClr val="tx1"/>
-                </a:solidFill>
-                <a:prstDash val="solid"/>
-                <a:round/>
-                <a:headEnd type="none" w="sm" len="sm"/>
-                <a:tailEnd type="none" w="sm" len="sm"/>
-              </a:ln>
-              <a:effectLst/>
-            </p:spPr>
-          </p:cxnSp>
-          <p:sp>
-            <p:nvSpPr>
-              <p:cNvPr id="57" name="Oval 56">
-                <a:extLst>
-                  <a:ext uri="{FF2B5EF4-FFF2-40B4-BE49-F238E27FC236}">
-                    <a16:creationId xmlns:a16="http://schemas.microsoft.com/office/drawing/2014/main" id="{764D43B5-65D9-C864-0B4D-89CBFB141B9D}"/>
-                  </a:ext>
-                </a:extLst>
-              </p:cNvPr>
-              <p:cNvSpPr/>
-              <p:nvPr/>
-            </p:nvSpPr>
-            <p:spPr bwMode="auto">
-              <a:xfrm>
-                <a:off x="6542233" y="1610429"/>
-                <a:ext cx="216284" cy="216284"/>
-              </a:xfrm>
-              <a:prstGeom prst="ellipse">
-                <a:avLst/>
-              </a:prstGeom>
-              <a:solidFill>
-                <a:srgbClr val="CCFFFF"/>
-              </a:solidFill>
-              <a:ln w="12700" cap="flat" cmpd="sng" algn="ctr">
-                <a:solidFill>
-                  <a:schemeClr val="tx1"/>
-                </a:solidFill>
-                <a:prstDash val="solid"/>
-                <a:round/>
-                <a:headEnd type="none" w="sm" len="sm"/>
-                <a:tailEnd type="none" w="sm" len="sm"/>
-              </a:ln>
-              <a:effectLst/>
-            </p:spPr>
-            <p:txBody>
-              <a:bodyPr vert="horz" wrap="square" lIns="91440" tIns="45720" rIns="91440" bIns="45720" numCol="1" rtlCol="0" anchor="ctr" anchorCtr="0" compatLnSpc="1">
-                <a:prstTxWarp prst="textNoShape">
-                  <a:avLst/>
-                </a:prstTxWarp>
-              </a:bodyPr>
-              <a:lstStyle/>
-              <a:p>
-                <a:pPr marL="0" marR="0" indent="0" algn="ctr" defTabSz="914400" rtl="0" eaLnBrk="0" fontAlgn="base" latinLnBrk="0" hangingPunct="0">
-                  <a:lnSpc>
-                    <a:spcPct val="100000"/>
-                  </a:lnSpc>
-                  <a:spcBef>
-                    <a:spcPct val="0"/>
-                  </a:spcBef>
-                  <a:spcAft>
-                    <a:spcPct val="0"/>
-                  </a:spcAft>
-                  <a:buClrTx/>
-                  <a:buSzTx/>
-                  <a:buFontTx/>
-                  <a:buNone/>
-                  <a:tabLst/>
-                </a:pPr>
-                <a:r>
-                  <a:rPr kumimoji="0" lang="en-US" sz="1200" b="0" i="1" u="none" strike="noStrike" cap="none" normalizeH="0" baseline="0" dirty="0">
-                    <a:ln>
-                      <a:noFill/>
-                    </a:ln>
-                    <a:solidFill>
-                      <a:schemeClr val="tx2"/>
-                    </a:solidFill>
-                    <a:effectLst/>
-                    <a:latin typeface="Verdana" panose="020B0604030504040204" pitchFamily="34" charset="0"/>
-                    <a:ea typeface="Verdana" panose="020B0604030504040204" pitchFamily="34" charset="0"/>
-                    <a:cs typeface="Verdana" panose="020B0604030504040204" pitchFamily="34" charset="0"/>
-                  </a:rPr>
-                  <a:t>f</a:t>
-                </a:r>
-              </a:p>
-            </p:txBody>
-          </p:sp>
-          <p:sp>
-            <p:nvSpPr>
-              <p:cNvPr id="58" name="Oval 57">
-                <a:extLst>
-                  <a:ext uri="{FF2B5EF4-FFF2-40B4-BE49-F238E27FC236}">
-                    <a16:creationId xmlns:a16="http://schemas.microsoft.com/office/drawing/2014/main" id="{2E4843D6-E771-64FD-1804-D3224B37F088}"/>
-                  </a:ext>
-                </a:extLst>
-              </p:cNvPr>
-              <p:cNvSpPr/>
-              <p:nvPr/>
-            </p:nvSpPr>
-            <p:spPr bwMode="auto">
-              <a:xfrm>
-                <a:off x="5096087" y="1610429"/>
-                <a:ext cx="216284" cy="216284"/>
-              </a:xfrm>
-              <a:prstGeom prst="ellipse">
-                <a:avLst/>
-              </a:prstGeom>
-              <a:solidFill>
-                <a:srgbClr val="CCFFCC"/>
-              </a:solidFill>
-              <a:ln w="12700" cap="flat" cmpd="sng" algn="ctr">
-                <a:solidFill>
-                  <a:schemeClr val="tx1"/>
-                </a:solidFill>
-                <a:prstDash val="solid"/>
-                <a:round/>
-                <a:headEnd type="none" w="sm" len="sm"/>
-                <a:tailEnd type="none" w="sm" len="sm"/>
-              </a:ln>
-              <a:effectLst/>
-            </p:spPr>
-            <p:txBody>
-              <a:bodyPr vert="horz" wrap="square" lIns="91440" tIns="45720" rIns="91440" bIns="45720" numCol="1" rtlCol="0" anchor="ctr" anchorCtr="0" compatLnSpc="1">
-                <a:prstTxWarp prst="textNoShape">
-                  <a:avLst/>
-                </a:prstTxWarp>
-              </a:bodyPr>
-              <a:lstStyle/>
-              <a:p>
-                <a:pPr marL="0" marR="0" indent="0" algn="ctr" defTabSz="914400" rtl="0" eaLnBrk="0" fontAlgn="base" latinLnBrk="0" hangingPunct="0">
-                  <a:lnSpc>
-                    <a:spcPct val="100000"/>
-                  </a:lnSpc>
-                  <a:spcBef>
-                    <a:spcPct val="0"/>
-                  </a:spcBef>
-                  <a:spcAft>
-                    <a:spcPct val="0"/>
-                  </a:spcAft>
-                  <a:buClrTx/>
-                  <a:buSzTx/>
-                  <a:buFontTx/>
-                  <a:buNone/>
-                  <a:tabLst/>
-                </a:pPr>
-                <a:r>
-                  <a:rPr kumimoji="0" lang="en-US" sz="1200" b="0" i="1" u="none" strike="noStrike" cap="none" normalizeH="0" baseline="0" dirty="0">
-                    <a:ln>
-                      <a:noFill/>
-                    </a:ln>
-                    <a:solidFill>
-                      <a:schemeClr val="tx2"/>
-                    </a:solidFill>
-                    <a:effectLst/>
-                    <a:latin typeface="Verdana" panose="020B0604030504040204" pitchFamily="34" charset="0"/>
-                    <a:ea typeface="Verdana" panose="020B0604030504040204" pitchFamily="34" charset="0"/>
-                    <a:cs typeface="Verdana" panose="020B0604030504040204" pitchFamily="34" charset="0"/>
-                  </a:rPr>
-                  <a:t>a</a:t>
-                </a:r>
-              </a:p>
-            </p:txBody>
-          </p:sp>
-          <p:sp>
-            <p:nvSpPr>
-              <p:cNvPr id="59" name="Oval 58">
-                <a:extLst>
-                  <a:ext uri="{FF2B5EF4-FFF2-40B4-BE49-F238E27FC236}">
-                    <a16:creationId xmlns:a16="http://schemas.microsoft.com/office/drawing/2014/main" id="{C7C00C6A-359B-FB2D-7D6C-B68E4D965186}"/>
-                  </a:ext>
-                </a:extLst>
-              </p:cNvPr>
-              <p:cNvSpPr/>
-              <p:nvPr/>
-            </p:nvSpPr>
-            <p:spPr bwMode="auto">
-              <a:xfrm>
-                <a:off x="5789453" y="2641420"/>
-                <a:ext cx="216284" cy="216284"/>
-              </a:xfrm>
-              <a:prstGeom prst="ellipse">
-                <a:avLst/>
-              </a:prstGeom>
-              <a:solidFill>
-                <a:srgbClr val="CCFFFF"/>
-              </a:solidFill>
-              <a:ln w="12700" cap="flat" cmpd="sng" algn="ctr">
-                <a:solidFill>
-                  <a:schemeClr val="tx1"/>
-                </a:solidFill>
-                <a:prstDash val="solid"/>
-                <a:round/>
-                <a:headEnd type="none" w="sm" len="sm"/>
-                <a:tailEnd type="none" w="sm" len="sm"/>
-              </a:ln>
-              <a:effectLst/>
-            </p:spPr>
-            <p:txBody>
-              <a:bodyPr vert="horz" wrap="square" lIns="91440" tIns="45720" rIns="91440" bIns="45720" numCol="1" rtlCol="0" anchor="ctr" anchorCtr="0" compatLnSpc="1">
-                <a:prstTxWarp prst="textNoShape">
-                  <a:avLst/>
-                </a:prstTxWarp>
-              </a:bodyPr>
-              <a:lstStyle/>
-              <a:p>
-                <a:pPr marL="0" marR="0" indent="0" algn="ctr" defTabSz="914400" rtl="0" eaLnBrk="0" fontAlgn="base" latinLnBrk="0" hangingPunct="0">
-                  <a:lnSpc>
-                    <a:spcPct val="100000"/>
-                  </a:lnSpc>
-                  <a:spcBef>
-                    <a:spcPct val="0"/>
-                  </a:spcBef>
-                  <a:spcAft>
-                    <a:spcPct val="0"/>
-                  </a:spcAft>
-                  <a:buClrTx/>
-                  <a:buSzTx/>
-                  <a:buFontTx/>
-                  <a:buNone/>
-                  <a:tabLst/>
-                </a:pPr>
-                <a:r>
-                  <a:rPr kumimoji="0" lang="en-US" sz="1200" b="0" i="1" u="none" strike="noStrike" cap="none" normalizeH="0" baseline="0" dirty="0">
-                    <a:ln>
-                      <a:noFill/>
-                    </a:ln>
-                    <a:solidFill>
-                      <a:schemeClr val="tx2"/>
-                    </a:solidFill>
-                    <a:effectLst/>
-                    <a:latin typeface="Verdana" panose="020B0604030504040204" pitchFamily="34" charset="0"/>
-                    <a:ea typeface="Verdana" panose="020B0604030504040204" pitchFamily="34" charset="0"/>
-                    <a:cs typeface="Verdana" panose="020B0604030504040204" pitchFamily="34" charset="0"/>
-                  </a:rPr>
-                  <a:t>g</a:t>
-                </a:r>
-              </a:p>
-            </p:txBody>
-          </p:sp>
-          <p:sp>
-            <p:nvSpPr>
-              <p:cNvPr id="60" name="Oval 59">
-                <a:extLst>
-                  <a:ext uri="{FF2B5EF4-FFF2-40B4-BE49-F238E27FC236}">
-                    <a16:creationId xmlns:a16="http://schemas.microsoft.com/office/drawing/2014/main" id="{BE077EF5-0B63-871E-1EE3-7B3D9C6AECFA}"/>
-                  </a:ext>
-                </a:extLst>
-              </p:cNvPr>
-              <p:cNvSpPr/>
-              <p:nvPr/>
-            </p:nvSpPr>
-            <p:spPr bwMode="auto">
-              <a:xfrm>
-                <a:off x="5064602" y="2641420"/>
-                <a:ext cx="216284" cy="216284"/>
-              </a:xfrm>
-              <a:prstGeom prst="ellipse">
-                <a:avLst/>
-              </a:prstGeom>
-              <a:solidFill>
-                <a:srgbClr val="CCFFCC"/>
-              </a:solidFill>
-              <a:ln w="12700" cap="flat" cmpd="sng" algn="ctr">
-                <a:solidFill>
-                  <a:schemeClr val="tx1"/>
-                </a:solidFill>
-                <a:prstDash val="solid"/>
-                <a:round/>
-                <a:headEnd type="none" w="sm" len="sm"/>
-                <a:tailEnd type="none" w="sm" len="sm"/>
-              </a:ln>
-              <a:effectLst/>
-            </p:spPr>
-            <p:txBody>
-              <a:bodyPr vert="horz" wrap="square" lIns="91440" tIns="45720" rIns="91440" bIns="45720" numCol="1" rtlCol="0" anchor="ctr" anchorCtr="0" compatLnSpc="1">
-                <a:prstTxWarp prst="textNoShape">
-                  <a:avLst/>
-                </a:prstTxWarp>
-              </a:bodyPr>
-              <a:lstStyle/>
-              <a:p>
-                <a:pPr marL="0" marR="0" indent="0" algn="ctr" defTabSz="914400" rtl="0" eaLnBrk="0" fontAlgn="base" latinLnBrk="0" hangingPunct="0">
-                  <a:lnSpc>
-                    <a:spcPct val="100000"/>
-                  </a:lnSpc>
-                  <a:spcBef>
-                    <a:spcPct val="0"/>
-                  </a:spcBef>
-                  <a:spcAft>
-                    <a:spcPct val="0"/>
-                  </a:spcAft>
-                  <a:buClrTx/>
-                  <a:buSzTx/>
-                  <a:buFontTx/>
-                  <a:buNone/>
-                  <a:tabLst/>
-                </a:pPr>
-                <a:r>
-                  <a:rPr lang="en-US" sz="1200" i="1" dirty="0">
-                    <a:latin typeface="Verdana" panose="020B0604030504040204" pitchFamily="34" charset="0"/>
-                    <a:ea typeface="Verdana" panose="020B0604030504040204" pitchFamily="34" charset="0"/>
-                    <a:cs typeface="Verdana" panose="020B0604030504040204" pitchFamily="34" charset="0"/>
-                  </a:rPr>
-                  <a:t>d</a:t>
-                </a:r>
-                <a:endParaRPr kumimoji="0" lang="en-US" sz="1200" b="0" i="1" u="none" strike="noStrike" cap="none" normalizeH="0" baseline="0" dirty="0">
-                  <a:ln>
-                    <a:noFill/>
-                  </a:ln>
-                  <a:solidFill>
-                    <a:schemeClr val="tx2"/>
-                  </a:solidFill>
-                  <a:effectLst/>
-                  <a:latin typeface="Verdana" panose="020B0604030504040204" pitchFamily="34" charset="0"/>
-                  <a:ea typeface="Verdana" panose="020B0604030504040204" pitchFamily="34" charset="0"/>
-                  <a:cs typeface="Verdana" panose="020B0604030504040204" pitchFamily="34" charset="0"/>
-                </a:endParaRPr>
-              </a:p>
-            </p:txBody>
-          </p:sp>
-          <p:cxnSp>
-            <p:nvCxnSpPr>
-              <p:cNvPr id="61" name="Straight Connector 60">
-                <a:extLst>
-                  <a:ext uri="{FF2B5EF4-FFF2-40B4-BE49-F238E27FC236}">
-                    <a16:creationId xmlns:a16="http://schemas.microsoft.com/office/drawing/2014/main" id="{8AEDE95A-B754-B785-30C2-53EA6F848651}"/>
-                  </a:ext>
-                </a:extLst>
-              </p:cNvPr>
-              <p:cNvCxnSpPr>
-                <a:cxnSpLocks/>
-                <a:stCxn id="59" idx="6"/>
-                <a:endCxn id="429064" idx="2"/>
-              </p:cNvCxnSpPr>
-              <p:nvPr/>
-            </p:nvCxnSpPr>
-            <p:spPr bwMode="auto">
-              <a:xfrm>
-                <a:off x="6005737" y="2749562"/>
-                <a:ext cx="533301" cy="0"/>
-              </a:xfrm>
-              <a:prstGeom prst="line">
-                <a:avLst/>
-              </a:prstGeom>
-              <a:solidFill>
-                <a:schemeClr val="accent1"/>
-              </a:solidFill>
-              <a:ln w="44450" cap="flat" cmpd="sng" algn="ctr">
-                <a:solidFill>
-                  <a:srgbClr val="0070C0"/>
-                </a:solidFill>
-                <a:prstDash val="solid"/>
-                <a:round/>
-                <a:headEnd type="none" w="sm" len="sm"/>
-                <a:tailEnd type="none" w="sm" len="sm"/>
-              </a:ln>
-              <a:effectLst/>
-            </p:spPr>
-          </p:cxnSp>
-          <p:cxnSp>
-            <p:nvCxnSpPr>
-              <p:cNvPr id="62" name="Straight Connector 61">
-                <a:extLst>
-                  <a:ext uri="{FF2B5EF4-FFF2-40B4-BE49-F238E27FC236}">
-                    <a16:creationId xmlns:a16="http://schemas.microsoft.com/office/drawing/2014/main" id="{345AA06A-907F-9A63-FBE9-89DC3FCFA977}"/>
-                  </a:ext>
-                </a:extLst>
-              </p:cNvPr>
-              <p:cNvCxnSpPr>
-                <a:cxnSpLocks/>
-                <a:stCxn id="59" idx="2"/>
-                <a:endCxn id="60" idx="6"/>
-              </p:cNvCxnSpPr>
-              <p:nvPr/>
-            </p:nvCxnSpPr>
-            <p:spPr bwMode="auto">
-              <a:xfrm flipH="1">
-                <a:off x="5280886" y="2749562"/>
-                <a:ext cx="508567" cy="0"/>
-              </a:xfrm>
-              <a:prstGeom prst="line">
-                <a:avLst/>
-              </a:prstGeom>
-              <a:solidFill>
-                <a:schemeClr val="accent1"/>
-              </a:solidFill>
-              <a:ln w="12700" cap="flat" cmpd="sng" algn="ctr">
-                <a:solidFill>
-                  <a:schemeClr val="tx1"/>
-                </a:solidFill>
-                <a:prstDash val="solid"/>
-                <a:round/>
-                <a:headEnd type="none" w="sm" len="sm"/>
-                <a:tailEnd type="none" w="sm" len="sm"/>
-              </a:ln>
-              <a:effectLst/>
-            </p:spPr>
-          </p:cxnSp>
-          <p:cxnSp>
-            <p:nvCxnSpPr>
-              <p:cNvPr id="63" name="Straight Connector 62">
-                <a:extLst>
-                  <a:ext uri="{FF2B5EF4-FFF2-40B4-BE49-F238E27FC236}">
-                    <a16:creationId xmlns:a16="http://schemas.microsoft.com/office/drawing/2014/main" id="{44285570-A364-0D02-EF4A-B841944B9CEC}"/>
-                  </a:ext>
-                </a:extLst>
-              </p:cNvPr>
-              <p:cNvCxnSpPr>
-                <a:cxnSpLocks/>
-                <a:stCxn id="57" idx="3"/>
-                <a:endCxn id="429063" idx="7"/>
-              </p:cNvCxnSpPr>
-              <p:nvPr/>
-            </p:nvCxnSpPr>
-            <p:spPr bwMode="auto">
-              <a:xfrm flipH="1">
-                <a:off x="5971884" y="1795039"/>
-                <a:ext cx="602023" cy="206302"/>
-              </a:xfrm>
-              <a:prstGeom prst="line">
-                <a:avLst/>
-              </a:prstGeom>
-              <a:solidFill>
-                <a:schemeClr val="accent1"/>
-              </a:solidFill>
-              <a:ln w="12700" cap="flat" cmpd="sng" algn="ctr">
-                <a:solidFill>
-                  <a:schemeClr val="tx1"/>
-                </a:solidFill>
-                <a:prstDash val="solid"/>
-                <a:round/>
-                <a:headEnd type="none" w="sm" len="sm"/>
-                <a:tailEnd type="none" w="sm" len="sm"/>
-              </a:ln>
-              <a:effectLst/>
-            </p:spPr>
-          </p:cxnSp>
-          <p:cxnSp>
-            <p:nvCxnSpPr>
-              <p:cNvPr id="429056" name="Straight Connector 429055">
-                <a:extLst>
-                  <a:ext uri="{FF2B5EF4-FFF2-40B4-BE49-F238E27FC236}">
-                    <a16:creationId xmlns:a16="http://schemas.microsoft.com/office/drawing/2014/main" id="{9E0E1ECC-F83D-02B9-2A52-714EB4884E35}"/>
-                  </a:ext>
-                </a:extLst>
-              </p:cNvPr>
-              <p:cNvCxnSpPr>
-                <a:cxnSpLocks/>
-                <a:stCxn id="59" idx="0"/>
-                <a:endCxn id="429063" idx="4"/>
-              </p:cNvCxnSpPr>
-              <p:nvPr/>
-            </p:nvCxnSpPr>
-            <p:spPr bwMode="auto">
-              <a:xfrm flipH="1" flipV="1">
-                <a:off x="5895416" y="2185951"/>
-                <a:ext cx="2179" cy="455469"/>
-              </a:xfrm>
-              <a:prstGeom prst="line">
-                <a:avLst/>
-              </a:prstGeom>
-              <a:solidFill>
-                <a:schemeClr val="accent1"/>
-              </a:solidFill>
-              <a:ln w="12700" cap="flat" cmpd="sng" algn="ctr">
-                <a:solidFill>
-                  <a:schemeClr val="tx1"/>
-                </a:solidFill>
-                <a:prstDash val="solid"/>
-                <a:round/>
-                <a:headEnd type="none" w="sm" len="sm"/>
-                <a:tailEnd type="none" w="sm" len="sm"/>
-              </a:ln>
-              <a:effectLst/>
-            </p:spPr>
-          </p:cxnSp>
-          <p:cxnSp>
-            <p:nvCxnSpPr>
-              <p:cNvPr id="429057" name="Straight Connector 429056">
-                <a:extLst>
-                  <a:ext uri="{FF2B5EF4-FFF2-40B4-BE49-F238E27FC236}">
-                    <a16:creationId xmlns:a16="http://schemas.microsoft.com/office/drawing/2014/main" id="{C67E1C82-1624-FC2D-D417-30E625E1666A}"/>
-                  </a:ext>
-                </a:extLst>
-              </p:cNvPr>
-              <p:cNvCxnSpPr>
-                <a:cxnSpLocks/>
-                <a:stCxn id="57" idx="4"/>
-                <a:endCxn id="429064" idx="0"/>
-              </p:cNvCxnSpPr>
-              <p:nvPr/>
-            </p:nvCxnSpPr>
-            <p:spPr bwMode="auto">
-              <a:xfrm flipH="1">
-                <a:off x="6647180" y="1826713"/>
-                <a:ext cx="3195" cy="814707"/>
-              </a:xfrm>
-              <a:prstGeom prst="line">
-                <a:avLst/>
-              </a:prstGeom>
-              <a:solidFill>
-                <a:schemeClr val="accent1"/>
-              </a:solidFill>
-              <a:ln w="12700" cap="flat" cmpd="sng" algn="ctr">
-                <a:solidFill>
-                  <a:schemeClr val="tx1"/>
-                </a:solidFill>
-                <a:prstDash val="solid"/>
-                <a:round/>
-                <a:headEnd type="none" w="sm" len="sm"/>
-                <a:tailEnd type="none" w="sm" len="sm"/>
-              </a:ln>
-              <a:effectLst/>
-            </p:spPr>
-          </p:cxnSp>
-          <p:sp>
-            <p:nvSpPr>
-              <p:cNvPr id="429063" name="Oval 429062">
-                <a:extLst>
-                  <a:ext uri="{FF2B5EF4-FFF2-40B4-BE49-F238E27FC236}">
-                    <a16:creationId xmlns:a16="http://schemas.microsoft.com/office/drawing/2014/main" id="{5B334749-9923-7638-D0FA-50B6CABA228F}"/>
-                  </a:ext>
-                </a:extLst>
-              </p:cNvPr>
-              <p:cNvSpPr/>
-              <p:nvPr/>
-            </p:nvSpPr>
-            <p:spPr bwMode="auto">
-              <a:xfrm>
-                <a:off x="5787274" y="1969667"/>
-                <a:ext cx="216284" cy="216284"/>
-              </a:xfrm>
-              <a:prstGeom prst="ellipse">
-                <a:avLst/>
-              </a:prstGeom>
-              <a:solidFill>
-                <a:srgbClr val="CCFFCC"/>
-              </a:solidFill>
-              <a:ln w="12700" cap="flat" cmpd="sng" algn="ctr">
-                <a:solidFill>
-                  <a:schemeClr val="tx1"/>
-                </a:solidFill>
-                <a:prstDash val="solid"/>
-                <a:round/>
-                <a:headEnd type="none" w="sm" len="sm"/>
-                <a:tailEnd type="none" w="sm" len="sm"/>
-              </a:ln>
-              <a:effectLst/>
-            </p:spPr>
-            <p:txBody>
-              <a:bodyPr vert="horz" wrap="square" lIns="91440" tIns="45720" rIns="91440" bIns="45720" numCol="1" rtlCol="0" anchor="ctr" anchorCtr="0" compatLnSpc="1">
-                <a:prstTxWarp prst="textNoShape">
-                  <a:avLst/>
-                </a:prstTxWarp>
-              </a:bodyPr>
-              <a:lstStyle/>
-              <a:p>
-                <a:pPr marL="0" marR="0" indent="0" algn="ctr" defTabSz="914400" rtl="0" eaLnBrk="0" fontAlgn="base" latinLnBrk="0" hangingPunct="0">
-                  <a:lnSpc>
-                    <a:spcPct val="100000"/>
-                  </a:lnSpc>
-                  <a:spcBef>
-                    <a:spcPct val="0"/>
-                  </a:spcBef>
-                  <a:spcAft>
-                    <a:spcPct val="0"/>
-                  </a:spcAft>
-                  <a:buClrTx/>
-                  <a:buSzTx/>
-                  <a:buFontTx/>
-                  <a:buNone/>
-                  <a:tabLst/>
-                </a:pPr>
-                <a:r>
-                  <a:rPr kumimoji="0" lang="en-US" sz="1200" b="0" i="1" u="none" strike="noStrike" cap="none" normalizeH="0" baseline="0" dirty="0">
-                    <a:ln>
-                      <a:noFill/>
-                    </a:ln>
-                    <a:solidFill>
-                      <a:schemeClr val="tx2"/>
-                    </a:solidFill>
-                    <a:effectLst/>
-                    <a:latin typeface="Verdana" panose="020B0604030504040204" pitchFamily="34" charset="0"/>
-                    <a:ea typeface="Verdana" panose="020B0604030504040204" pitchFamily="34" charset="0"/>
-                    <a:cs typeface="Verdana" panose="020B0604030504040204" pitchFamily="34" charset="0"/>
-                  </a:rPr>
-                  <a:t>e</a:t>
-                </a:r>
-              </a:p>
-            </p:txBody>
-          </p:sp>
-          <p:sp>
-            <p:nvSpPr>
-              <p:cNvPr id="429064" name="Oval 429063">
-                <a:extLst>
-                  <a:ext uri="{FF2B5EF4-FFF2-40B4-BE49-F238E27FC236}">
-                    <a16:creationId xmlns:a16="http://schemas.microsoft.com/office/drawing/2014/main" id="{746C4D02-EBCA-8A27-9788-F5CFDD3CBFC5}"/>
-                  </a:ext>
-                </a:extLst>
-              </p:cNvPr>
-              <p:cNvSpPr/>
-              <p:nvPr/>
-            </p:nvSpPr>
-            <p:spPr bwMode="auto">
-              <a:xfrm>
-                <a:off x="6539038" y="2641420"/>
-                <a:ext cx="216284" cy="216284"/>
-              </a:xfrm>
-              <a:prstGeom prst="ellipse">
-                <a:avLst/>
-              </a:prstGeom>
-              <a:solidFill>
-                <a:srgbClr val="CCFFCC"/>
-              </a:solidFill>
-              <a:ln w="12700" cap="flat" cmpd="sng" algn="ctr">
-                <a:solidFill>
-                  <a:schemeClr val="tx1"/>
-                </a:solidFill>
-                <a:prstDash val="solid"/>
-                <a:round/>
-                <a:headEnd type="none" w="sm" len="sm"/>
-                <a:tailEnd type="none" w="sm" len="sm"/>
-              </a:ln>
-              <a:effectLst/>
-            </p:spPr>
-            <p:txBody>
-              <a:bodyPr vert="horz" wrap="square" lIns="91440" tIns="45720" rIns="91440" bIns="45720" numCol="1" rtlCol="0" anchor="ctr" anchorCtr="0" compatLnSpc="1">
-                <a:prstTxWarp prst="textNoShape">
-                  <a:avLst/>
-                </a:prstTxWarp>
-              </a:bodyPr>
-              <a:lstStyle/>
-              <a:p>
-                <a:pPr marL="0" marR="0" indent="0" algn="ctr" defTabSz="914400" rtl="0" eaLnBrk="0" fontAlgn="base" latinLnBrk="0" hangingPunct="0">
-                  <a:lnSpc>
-                    <a:spcPct val="100000"/>
-                  </a:lnSpc>
-                  <a:spcBef>
-                    <a:spcPct val="0"/>
-                  </a:spcBef>
-                  <a:spcAft>
-                    <a:spcPct val="0"/>
-                  </a:spcAft>
-                  <a:buClrTx/>
-                  <a:buSzTx/>
-                  <a:buFontTx/>
-                  <a:buNone/>
-                  <a:tabLst/>
-                </a:pPr>
-                <a:r>
-                  <a:rPr kumimoji="0" lang="en-US" sz="1200" b="0" i="1" u="none" strike="noStrike" cap="none" normalizeH="0" baseline="0" dirty="0">
-                    <a:ln>
-                      <a:noFill/>
-                    </a:ln>
-                    <a:solidFill>
-                      <a:schemeClr val="tx2"/>
-                    </a:solidFill>
-                    <a:effectLst/>
-                    <a:latin typeface="Verdana" panose="020B0604030504040204" pitchFamily="34" charset="0"/>
-                    <a:ea typeface="Verdana" panose="020B0604030504040204" pitchFamily="34" charset="0"/>
-                    <a:cs typeface="Verdana" panose="020B0604030504040204" pitchFamily="34" charset="0"/>
-                  </a:rPr>
-                  <a:t>h</a:t>
-                </a:r>
-              </a:p>
-            </p:txBody>
-          </p:sp>
-          <p:cxnSp>
-            <p:nvCxnSpPr>
-              <p:cNvPr id="429065" name="Straight Connector 429064">
-                <a:extLst>
-                  <a:ext uri="{FF2B5EF4-FFF2-40B4-BE49-F238E27FC236}">
-                    <a16:creationId xmlns:a16="http://schemas.microsoft.com/office/drawing/2014/main" id="{FEB33889-C0C0-6421-821E-B6860B702208}"/>
-                  </a:ext>
-                </a:extLst>
-              </p:cNvPr>
-              <p:cNvCxnSpPr>
-                <a:cxnSpLocks/>
-                <a:stCxn id="58" idx="6"/>
-                <a:endCxn id="57" idx="2"/>
-              </p:cNvCxnSpPr>
-              <p:nvPr/>
-            </p:nvCxnSpPr>
-            <p:spPr bwMode="auto">
-              <a:xfrm>
-                <a:off x="5312371" y="1718571"/>
-                <a:ext cx="1229862" cy="0"/>
-              </a:xfrm>
-              <a:prstGeom prst="line">
-                <a:avLst/>
-              </a:prstGeom>
-              <a:solidFill>
-                <a:schemeClr val="accent1"/>
-              </a:solidFill>
-              <a:ln w="44450" cap="flat" cmpd="sng" algn="ctr">
-                <a:solidFill>
-                  <a:srgbClr val="0070C0"/>
-                </a:solidFill>
-                <a:prstDash val="solid"/>
-                <a:round/>
-                <a:headEnd type="none" w="sm" len="sm"/>
-                <a:tailEnd type="none" w="sm" len="sm"/>
-              </a:ln>
-              <a:effectLst/>
-            </p:spPr>
-          </p:cxnSp>
-          <p:sp>
-            <p:nvSpPr>
-              <p:cNvPr id="429091" name="Text Box 59">
-                <a:extLst>
-                  <a:ext uri="{FF2B5EF4-FFF2-40B4-BE49-F238E27FC236}">
-                    <a16:creationId xmlns:a16="http://schemas.microsoft.com/office/drawing/2014/main" id="{B93DFC3C-2DE5-0F19-2B53-4175C17DDEAB}"/>
-                  </a:ext>
-                </a:extLst>
-              </p:cNvPr>
-              <p:cNvSpPr txBox="1">
-                <a:spLocks noChangeArrowheads="1"/>
-              </p:cNvSpPr>
-              <p:nvPr/>
-            </p:nvSpPr>
-            <p:spPr bwMode="auto">
-              <a:xfrm>
-                <a:off x="4169500" y="2110536"/>
-                <a:ext cx="240450" cy="246221"/>
-              </a:xfrm>
-              <a:prstGeom prst="rect">
-                <a:avLst/>
-              </a:prstGeom>
-              <a:noFill/>
-              <a:ln w="12700">
-                <a:noFill/>
-                <a:miter lim="800000"/>
-                <a:headEnd type="none" w="sm" len="sm"/>
-                <a:tailEnd type="none" w="sm" len="sm"/>
-              </a:ln>
-              <a:effectLst/>
-            </p:spPr>
-            <p:txBody>
-              <a:bodyPr wrap="none" lIns="0" tIns="0" rIns="0" bIns="0" anchor="ctr" anchorCtr="1">
-                <a:spAutoFit/>
-              </a:bodyPr>
-              <a:lstStyle/>
-              <a:p>
-                <a:pPr algn="l">
-                  <a:spcBef>
-                    <a:spcPct val="50000"/>
-                  </a:spcBef>
-                </a:pPr>
-                <a:r>
-                  <a:rPr lang="en-US" i="1" dirty="0">
-                    <a:latin typeface="+mn-lt"/>
-                  </a:rPr>
-                  <a:t>H</a:t>
-                </a:r>
-                <a:r>
-                  <a:rPr lang="en-US" baseline="-25000" dirty="0">
-                    <a:latin typeface="+mn-lt"/>
-                  </a:rPr>
-                  <a:t>1</a:t>
-                </a:r>
-              </a:p>
-            </p:txBody>
-          </p:sp>
-          <p:sp>
-            <p:nvSpPr>
-              <p:cNvPr id="429092" name="Text Box 59">
-                <a:extLst>
-                  <a:ext uri="{FF2B5EF4-FFF2-40B4-BE49-F238E27FC236}">
-                    <a16:creationId xmlns:a16="http://schemas.microsoft.com/office/drawing/2014/main" id="{F676590C-D42F-EF3A-8FFD-A32F12F665EE}"/>
-                  </a:ext>
-                </a:extLst>
-              </p:cNvPr>
-              <p:cNvSpPr txBox="1">
-                <a:spLocks noChangeArrowheads="1"/>
-              </p:cNvSpPr>
-              <p:nvPr/>
-            </p:nvSpPr>
-            <p:spPr bwMode="auto">
-              <a:xfrm>
-                <a:off x="5306984" y="2110536"/>
-                <a:ext cx="240450" cy="246221"/>
-              </a:xfrm>
-              <a:prstGeom prst="rect">
-                <a:avLst/>
-              </a:prstGeom>
-              <a:noFill/>
-              <a:ln w="12700">
-                <a:noFill/>
-                <a:miter lim="800000"/>
-                <a:headEnd type="none" w="sm" len="sm"/>
-                <a:tailEnd type="none" w="sm" len="sm"/>
-              </a:ln>
-              <a:effectLst/>
-            </p:spPr>
-            <p:txBody>
-              <a:bodyPr wrap="none" lIns="0" tIns="0" rIns="0" bIns="0" anchor="ctr" anchorCtr="1">
-                <a:spAutoFit/>
-              </a:bodyPr>
-              <a:lstStyle/>
-              <a:p>
-                <a:pPr algn="l">
-                  <a:spcBef>
-                    <a:spcPct val="50000"/>
-                  </a:spcBef>
-                </a:pPr>
-                <a:r>
-                  <a:rPr lang="en-US" i="1" dirty="0">
-                    <a:latin typeface="+mn-lt"/>
-                  </a:rPr>
-                  <a:t>H</a:t>
-                </a:r>
-                <a:r>
-                  <a:rPr lang="en-US" baseline="-25000" dirty="0">
-                    <a:latin typeface="+mn-lt"/>
-                  </a:rPr>
-                  <a:t>2</a:t>
-                </a:r>
-              </a:p>
-            </p:txBody>
-          </p:sp>
-        </p:grpSp>
-        <p:sp>
-          <p:nvSpPr>
-            <p:cNvPr id="429093" name="Right Arrow 429092">
-              <a:extLst>
-                <a:ext uri="{FF2B5EF4-FFF2-40B4-BE49-F238E27FC236}">
-                  <a16:creationId xmlns:a16="http://schemas.microsoft.com/office/drawing/2014/main" id="{10ACD51F-47D1-3FF9-9215-4BDD1D8F5A3A}"/>
-                </a:ext>
-              </a:extLst>
-            </p:cNvPr>
-            <p:cNvSpPr/>
-            <p:nvPr/>
-          </p:nvSpPr>
-          <p:spPr bwMode="auto">
-            <a:xfrm>
-              <a:off x="6880874" y="2099005"/>
-              <a:ext cx="424543" cy="250372"/>
-            </a:xfrm>
-            <a:prstGeom prst="rightArrow">
-              <a:avLst/>
-            </a:prstGeom>
-            <a:solidFill>
-              <a:schemeClr val="accent1"/>
-            </a:solidFill>
-            <a:ln w="12700" cap="flat" cmpd="sng" algn="ctr">
-              <a:solidFill>
-                <a:schemeClr val="tx1"/>
-              </a:solidFill>
-              <a:prstDash val="solid"/>
-              <a:round/>
-              <a:headEnd type="none" w="sm" len="sm"/>
-              <a:tailEnd type="none" w="sm" len="sm"/>
-            </a:ln>
-            <a:effectLst/>
-          </p:spPr>
-          <p:txBody>
-            <a:bodyPr vert="horz" wrap="square" lIns="91440" tIns="45720" rIns="91440" bIns="45720" numCol="1" rtlCol="0" anchor="t" anchorCtr="0" compatLnSpc="1">
-              <a:prstTxWarp prst="textNoShape">
-                <a:avLst/>
-              </a:prstTxWarp>
-            </a:bodyPr>
-            <a:lstStyle/>
-            <a:p>
-              <a:pPr marL="0" marR="0" indent="0" algn="l" defTabSz="914400" rtl="0" eaLnBrk="0" fontAlgn="base" latinLnBrk="0" hangingPunct="0">
-                <a:lnSpc>
-                  <a:spcPct val="100000"/>
-                </a:lnSpc>
-                <a:spcBef>
-                  <a:spcPct val="0"/>
-                </a:spcBef>
-                <a:spcAft>
-                  <a:spcPct val="0"/>
-                </a:spcAft>
-                <a:buClrTx/>
-                <a:buSzTx/>
-                <a:buFontTx/>
-                <a:buNone/>
-                <a:tabLst/>
-              </a:pPr>
-              <a:endParaRPr kumimoji="0" lang="en-US" sz="1600" b="0" i="0" u="none" strike="noStrike" cap="none" normalizeH="0" baseline="0">
-                <a:ln>
-                  <a:noFill/>
-                </a:ln>
-                <a:solidFill>
-                  <a:schemeClr val="tx2"/>
-                </a:solidFill>
-                <a:effectLst/>
-                <a:latin typeface="Book Antiqua" pitchFamily="18" charset="0"/>
-              </a:endParaRPr>
-            </a:p>
-          </p:txBody>
-        </p:sp>
-      </p:grpSp>
-    </p:spTree>
-    <p:extLst>
-      <p:ext uri="{BB962C8B-B14F-4D97-AF65-F5344CB8AC3E}">
-        <p14:creationId xmlns:p14="http://schemas.microsoft.com/office/powerpoint/2010/main" val="3359654132"/>
-      </p:ext>
-    </p:extLst>
-  </p:cSld>
-  <p:clrMapOvr>
-    <a:masterClrMapping/>
-  </p:clrMapOvr>
-  <p:transition/>
-</p:sld>
-</file>
-
-<file path=ppt/slides/slide4.xml><?xml version="1.0" encoding="utf-8"?>
-<p:sld xmlns:a="http://schemas.openxmlformats.org/drawingml/2006/main" xmlns:r="http://schemas.openxmlformats.org/officeDocument/2006/relationships" xmlns:p="http://schemas.openxmlformats.org/presentationml/2006/main" showMasterPhAnim="0">
-  <p:cSld>
-    <p:spTree>
-      <p:nvGrpSpPr>
-        <p:cNvPr id="1" name=""/>
-        <p:cNvGrpSpPr/>
-        <p:nvPr/>
-      </p:nvGrpSpPr>
-      <p:grpSpPr>
-        <a:xfrm>
-          <a:off x="0" y="0"/>
-          <a:ext cx="0" cy="0"/>
-          <a:chOff x="0" y="0"/>
-          <a:chExt cx="0" cy="0"/>
-        </a:xfrm>
-      </p:grpSpPr>
-      <p:sp>
-        <p:nvSpPr>
-          <p:cNvPr id="429058" name="Rectangle 2"/>
-          <p:cNvSpPr>
-            <a:spLocks noGrp="1" noChangeArrowheads="1"/>
-          </p:cNvSpPr>
-          <p:nvPr>
-            <p:ph type="title"/>
-          </p:nvPr>
-        </p:nvSpPr>
-        <p:spPr/>
-        <p:txBody>
-          <a:bodyPr/>
-          <a:lstStyle/>
-          <a:p>
-            <a:r>
-              <a:rPr lang="en-US" dirty="0" err="1"/>
               <a:t>gabow</a:t>
             </a:r>
             <a:endParaRPr lang="en-US" dirty="0"/>
@@ -25415,7 +21626,7 @@
 </p:sld>
 </file>
 
-<file path=ppt/slides/slide5.xml><?xml version="1.0" encoding="utf-8"?>
+<file path=ppt/slides/slide4.xml><?xml version="1.0" encoding="utf-8"?>
 <p:sld xmlns:a="http://schemas.openxmlformats.org/drawingml/2006/main" xmlns:r="http://schemas.openxmlformats.org/officeDocument/2006/relationships" xmlns:p="http://schemas.openxmlformats.org/presentationml/2006/main" showMasterPhAnim="0">
   <p:cSld>
     <p:spTree>
@@ -31203,7 +27414,7 @@
 </p:sld>
 </file>
 
-<file path=ppt/slides/slide6.xml><?xml version="1.0" encoding="utf-8"?>
+<file path=ppt/slides/slide5.xml><?xml version="1.0" encoding="utf-8"?>
 <p:sld xmlns:a="http://schemas.openxmlformats.org/drawingml/2006/main" xmlns:r="http://schemas.openxmlformats.org/officeDocument/2006/relationships" xmlns:p="http://schemas.openxmlformats.org/presentationml/2006/main" showMasterPhAnim="0">
   <p:cSld>
     <p:spTree>

</xml_diff>